<commit_message>
Code done and presentation prepared
</commit_message>
<xml_diff>
--- a/Presentation.pptx
+++ b/Presentation.pptx
@@ -6,6 +6,20 @@
   </p:sldMasterIdLst>
   <p:sldIdLst>
     <p:sldId id="256" r:id="rId2"/>
+    <p:sldId id="257" r:id="rId3"/>
+    <p:sldId id="258" r:id="rId4"/>
+    <p:sldId id="259" r:id="rId5"/>
+    <p:sldId id="261" r:id="rId6"/>
+    <p:sldId id="262" r:id="rId7"/>
+    <p:sldId id="260" r:id="rId8"/>
+    <p:sldId id="264" r:id="rId9"/>
+    <p:sldId id="263" r:id="rId10"/>
+    <p:sldId id="265" r:id="rId11"/>
+    <p:sldId id="266" r:id="rId12"/>
+    <p:sldId id="267" r:id="rId13"/>
+    <p:sldId id="268" r:id="rId14"/>
+    <p:sldId id="269" r:id="rId15"/>
+    <p:sldId id="270" r:id="rId16"/>
   </p:sldIdLst>
   <p:sldSz cx="12192000" cy="6858000"/>
   <p:notesSz cx="6858000" cy="9144000"/>
@@ -104,6 +118,11 @@
       </a:defRPr>
     </a:lvl9pPr>
   </p:defaultTextStyle>
+  <p:extLst>
+    <p:ext uri="{EFAFB233-063F-42B5-8137-9DF3F51BA10A}">
+      <p15:sldGuideLst xmlns:p15="http://schemas.microsoft.com/office/powerpoint/2012/main"/>
+    </p:ext>
+  </p:extLst>
 </p:presentation>
 </file>
 
@@ -254,7 +273,7 @@
           <a:p>
             <a:fld id="{02BEDA68-08EF-2F4B-8BF6-A84FCF6A6CE4}" type="datetimeFigureOut">
               <a:rPr lang="sv-SE" smtClean="0"/>
-              <a:t>2021-10-14</a:t>
+              <a:t>2021-10-18</a:t>
             </a:fld>
             <a:endParaRPr lang="sv-SE"/>
           </a:p>
@@ -452,7 +471,7 @@
           <a:p>
             <a:fld id="{02BEDA68-08EF-2F4B-8BF6-A84FCF6A6CE4}" type="datetimeFigureOut">
               <a:rPr lang="sv-SE" smtClean="0"/>
-              <a:t>2021-10-14</a:t>
+              <a:t>2021-10-18</a:t>
             </a:fld>
             <a:endParaRPr lang="sv-SE"/>
           </a:p>
@@ -660,7 +679,7 @@
           <a:p>
             <a:fld id="{02BEDA68-08EF-2F4B-8BF6-A84FCF6A6CE4}" type="datetimeFigureOut">
               <a:rPr lang="sv-SE" smtClean="0"/>
-              <a:t>2021-10-14</a:t>
+              <a:t>2021-10-18</a:t>
             </a:fld>
             <a:endParaRPr lang="sv-SE"/>
           </a:p>
@@ -858,7 +877,7 @@
           <a:p>
             <a:fld id="{02BEDA68-08EF-2F4B-8BF6-A84FCF6A6CE4}" type="datetimeFigureOut">
               <a:rPr lang="sv-SE" smtClean="0"/>
-              <a:t>2021-10-14</a:t>
+              <a:t>2021-10-18</a:t>
             </a:fld>
             <a:endParaRPr lang="sv-SE"/>
           </a:p>
@@ -1133,7 +1152,7 @@
           <a:p>
             <a:fld id="{02BEDA68-08EF-2F4B-8BF6-A84FCF6A6CE4}" type="datetimeFigureOut">
               <a:rPr lang="sv-SE" smtClean="0"/>
-              <a:t>2021-10-14</a:t>
+              <a:t>2021-10-18</a:t>
             </a:fld>
             <a:endParaRPr lang="sv-SE"/>
           </a:p>
@@ -1398,7 +1417,7 @@
           <a:p>
             <a:fld id="{02BEDA68-08EF-2F4B-8BF6-A84FCF6A6CE4}" type="datetimeFigureOut">
               <a:rPr lang="sv-SE" smtClean="0"/>
-              <a:t>2021-10-14</a:t>
+              <a:t>2021-10-18</a:t>
             </a:fld>
             <a:endParaRPr lang="sv-SE"/>
           </a:p>
@@ -1810,7 +1829,7 @@
           <a:p>
             <a:fld id="{02BEDA68-08EF-2F4B-8BF6-A84FCF6A6CE4}" type="datetimeFigureOut">
               <a:rPr lang="sv-SE" smtClean="0"/>
-              <a:t>2021-10-14</a:t>
+              <a:t>2021-10-18</a:t>
             </a:fld>
             <a:endParaRPr lang="sv-SE"/>
           </a:p>
@@ -1951,7 +1970,7 @@
           <a:p>
             <a:fld id="{02BEDA68-08EF-2F4B-8BF6-A84FCF6A6CE4}" type="datetimeFigureOut">
               <a:rPr lang="sv-SE" smtClean="0"/>
-              <a:t>2021-10-14</a:t>
+              <a:t>2021-10-18</a:t>
             </a:fld>
             <a:endParaRPr lang="sv-SE"/>
           </a:p>
@@ -2064,7 +2083,7 @@
           <a:p>
             <a:fld id="{02BEDA68-08EF-2F4B-8BF6-A84FCF6A6CE4}" type="datetimeFigureOut">
               <a:rPr lang="sv-SE" smtClean="0"/>
-              <a:t>2021-10-14</a:t>
+              <a:t>2021-10-18</a:t>
             </a:fld>
             <a:endParaRPr lang="sv-SE"/>
           </a:p>
@@ -2375,7 +2394,7 @@
           <a:p>
             <a:fld id="{02BEDA68-08EF-2F4B-8BF6-A84FCF6A6CE4}" type="datetimeFigureOut">
               <a:rPr lang="sv-SE" smtClean="0"/>
-              <a:t>2021-10-14</a:t>
+              <a:t>2021-10-18</a:t>
             </a:fld>
             <a:endParaRPr lang="sv-SE"/>
           </a:p>
@@ -2663,7 +2682,7 @@
           <a:p>
             <a:fld id="{02BEDA68-08EF-2F4B-8BF6-A84FCF6A6CE4}" type="datetimeFigureOut">
               <a:rPr lang="sv-SE" smtClean="0"/>
-              <a:t>2021-10-14</a:t>
+              <a:t>2021-10-18</a:t>
             </a:fld>
             <a:endParaRPr lang="sv-SE"/>
           </a:p>
@@ -2904,7 +2923,7 @@
           <a:p>
             <a:fld id="{02BEDA68-08EF-2F4B-8BF6-A84FCF6A6CE4}" type="datetimeFigureOut">
               <a:rPr lang="sv-SE" smtClean="0"/>
-              <a:t>2021-10-14</a:t>
+              <a:t>2021-10-18</a:t>
             </a:fld>
             <a:endParaRPr lang="sv-SE"/>
           </a:p>
@@ -3390,6 +3409,4168 @@
 </p:sld>
 </file>
 
+<file path=ppt/slides/slide10.xml><?xml version="1.0" encoding="utf-8"?>
+<p:sld xmlns:a="http://schemas.openxmlformats.org/drawingml/2006/main" xmlns:r="http://schemas.openxmlformats.org/officeDocument/2006/relationships" xmlns:p="http://schemas.openxmlformats.org/presentationml/2006/main">
+  <p:cSld>
+    <p:spTree>
+      <p:nvGrpSpPr>
+        <p:cNvPr id="1" name=""/>
+        <p:cNvGrpSpPr/>
+        <p:nvPr/>
+      </p:nvGrpSpPr>
+      <p:grpSpPr>
+        <a:xfrm>
+          <a:off x="0" y="0"/>
+          <a:ext cx="0" cy="0"/>
+          <a:chOff x="0" y="0"/>
+          <a:chExt cx="0" cy="0"/>
+        </a:xfrm>
+      </p:grpSpPr>
+      <p:sp>
+        <p:nvSpPr>
+          <p:cNvPr id="2" name="Rubrik 1">
+            <a:extLst>
+              <a:ext uri="{FF2B5EF4-FFF2-40B4-BE49-F238E27FC236}">
+                <a16:creationId xmlns:a16="http://schemas.microsoft.com/office/drawing/2014/main" id="{1AE2AAEE-C7DF-6846-BF17-9104975FA6D9}"/>
+              </a:ext>
+            </a:extLst>
+          </p:cNvPr>
+          <p:cNvSpPr>
+            <a:spLocks noGrp="1"/>
+          </p:cNvSpPr>
+          <p:nvPr>
+            <p:ph type="title"/>
+          </p:nvPr>
+        </p:nvSpPr>
+        <p:spPr/>
+        <p:txBody>
+          <a:bodyPr/>
+          <a:lstStyle/>
+          <a:p>
+            <a:r>
+              <a:rPr lang="sv-SE" dirty="0" err="1"/>
+              <a:t>Assignment</a:t>
+            </a:r>
+            <a:r>
+              <a:rPr lang="sv-SE" dirty="0"/>
+              <a:t> 6: Decision </a:t>
+            </a:r>
+            <a:r>
+              <a:rPr lang="sv-SE" dirty="0" err="1"/>
+              <a:t>Tree</a:t>
+            </a:r>
+            <a:r>
+              <a:rPr lang="sv-SE" dirty="0"/>
+              <a:t> Iris</a:t>
+            </a:r>
+          </a:p>
+        </p:txBody>
+      </p:sp>
+      <p:pic>
+        <p:nvPicPr>
+          <p:cNvPr id="5" name="Platshållare för innehåll 4">
+            <a:extLst>
+              <a:ext uri="{FF2B5EF4-FFF2-40B4-BE49-F238E27FC236}">
+                <a16:creationId xmlns:a16="http://schemas.microsoft.com/office/drawing/2014/main" id="{4006AE9F-8FFA-FE4C-A400-F33A55728BCD}"/>
+              </a:ext>
+            </a:extLst>
+          </p:cNvPr>
+          <p:cNvPicPr>
+            <a:picLocks noGrp="1" noChangeAspect="1"/>
+          </p:cNvPicPr>
+          <p:nvPr>
+            <p:ph idx="1"/>
+          </p:nvPr>
+        </p:nvPicPr>
+        <p:blipFill>
+          <a:blip r:embed="rId2"/>
+          <a:stretch>
+            <a:fillRect/>
+          </a:stretch>
+        </p:blipFill>
+        <p:spPr>
+          <a:xfrm>
+            <a:off x="5654675" y="1534319"/>
+            <a:ext cx="6311900" cy="2019300"/>
+          </a:xfrm>
+          <a:prstGeom prst="rect">
+            <a:avLst/>
+          </a:prstGeom>
+        </p:spPr>
+      </p:pic>
+      <p:pic>
+        <p:nvPicPr>
+          <p:cNvPr id="6" name="Bildobjekt 5">
+            <a:extLst>
+              <a:ext uri="{FF2B5EF4-FFF2-40B4-BE49-F238E27FC236}">
+                <a16:creationId xmlns:a16="http://schemas.microsoft.com/office/drawing/2014/main" id="{04C4B9C1-8145-D84A-B17C-B313A191481D}"/>
+              </a:ext>
+            </a:extLst>
+          </p:cNvPr>
+          <p:cNvPicPr>
+            <a:picLocks noChangeAspect="1"/>
+          </p:cNvPicPr>
+          <p:nvPr/>
+        </p:nvPicPr>
+        <p:blipFill>
+          <a:blip r:embed="rId3"/>
+          <a:stretch>
+            <a:fillRect/>
+          </a:stretch>
+        </p:blipFill>
+        <p:spPr>
+          <a:xfrm>
+            <a:off x="5692775" y="4333081"/>
+            <a:ext cx="6273800" cy="1981200"/>
+          </a:xfrm>
+          <a:prstGeom prst="rect">
+            <a:avLst/>
+          </a:prstGeom>
+        </p:spPr>
+      </p:pic>
+      <p:sp>
+        <p:nvSpPr>
+          <p:cNvPr id="7" name="textruta 6">
+            <a:extLst>
+              <a:ext uri="{FF2B5EF4-FFF2-40B4-BE49-F238E27FC236}">
+                <a16:creationId xmlns:a16="http://schemas.microsoft.com/office/drawing/2014/main" id="{302CFAA5-4FB1-A641-9E78-177067C27345}"/>
+              </a:ext>
+            </a:extLst>
+          </p:cNvPr>
+          <p:cNvSpPr txBox="1"/>
+          <p:nvPr/>
+        </p:nvSpPr>
+        <p:spPr>
+          <a:xfrm>
+            <a:off x="2700338" y="2343150"/>
+            <a:ext cx="1412310" cy="369332"/>
+          </a:xfrm>
+          <a:prstGeom prst="rect">
+            <a:avLst/>
+          </a:prstGeom>
+          <a:noFill/>
+        </p:spPr>
+        <p:txBody>
+          <a:bodyPr wrap="none" rtlCol="0">
+            <a:spAutoFit/>
+          </a:bodyPr>
+          <a:lstStyle/>
+          <a:p>
+            <a:r>
+              <a:rPr lang="sv-SE" dirty="0"/>
+              <a:t>Not </a:t>
+            </a:r>
+            <a:r>
+              <a:rPr lang="sv-SE" dirty="0" err="1"/>
+              <a:t>boosted</a:t>
+            </a:r>
+            <a:r>
+              <a:rPr lang="sv-SE" dirty="0"/>
+              <a:t>:</a:t>
+            </a:r>
+          </a:p>
+        </p:txBody>
+      </p:sp>
+      <p:sp>
+        <p:nvSpPr>
+          <p:cNvPr id="8" name="textruta 7">
+            <a:extLst>
+              <a:ext uri="{FF2B5EF4-FFF2-40B4-BE49-F238E27FC236}">
+                <a16:creationId xmlns:a16="http://schemas.microsoft.com/office/drawing/2014/main" id="{7723C482-0006-6241-A292-21A59005FDD3}"/>
+              </a:ext>
+            </a:extLst>
+          </p:cNvPr>
+          <p:cNvSpPr txBox="1"/>
+          <p:nvPr/>
+        </p:nvSpPr>
+        <p:spPr>
+          <a:xfrm>
+            <a:off x="2700338" y="4843463"/>
+            <a:ext cx="1014765" cy="369332"/>
+          </a:xfrm>
+          <a:prstGeom prst="rect">
+            <a:avLst/>
+          </a:prstGeom>
+          <a:noFill/>
+        </p:spPr>
+        <p:txBody>
+          <a:bodyPr wrap="none" rtlCol="0">
+            <a:spAutoFit/>
+          </a:bodyPr>
+          <a:lstStyle/>
+          <a:p>
+            <a:r>
+              <a:rPr lang="sv-SE" dirty="0" err="1"/>
+              <a:t>Boosted</a:t>
+            </a:r>
+            <a:r>
+              <a:rPr lang="sv-SE" dirty="0"/>
+              <a:t>:</a:t>
+            </a:r>
+          </a:p>
+        </p:txBody>
+      </p:sp>
+      <p:sp>
+        <p:nvSpPr>
+          <p:cNvPr id="10" name="textruta 9">
+            <a:extLst>
+              <a:ext uri="{FF2B5EF4-FFF2-40B4-BE49-F238E27FC236}">
+                <a16:creationId xmlns:a16="http://schemas.microsoft.com/office/drawing/2014/main" id="{C6A35928-DFE3-FF43-B7D2-5585339C94FD}"/>
+              </a:ext>
+            </a:extLst>
+          </p:cNvPr>
+          <p:cNvSpPr txBox="1"/>
+          <p:nvPr/>
+        </p:nvSpPr>
+        <p:spPr>
+          <a:xfrm>
+            <a:off x="743007" y="1690688"/>
+            <a:ext cx="2663486" cy="369332"/>
+          </a:xfrm>
+          <a:prstGeom prst="rect">
+            <a:avLst/>
+          </a:prstGeom>
+          <a:noFill/>
+        </p:spPr>
+        <p:txBody>
+          <a:bodyPr wrap="none" rtlCol="0">
+            <a:spAutoFit/>
+          </a:bodyPr>
+          <a:lstStyle/>
+          <a:p>
+            <a:r>
+              <a:rPr lang="sv-SE" dirty="0" err="1"/>
+              <a:t>Improvement</a:t>
+            </a:r>
+            <a:r>
+              <a:rPr lang="sv-SE" dirty="0"/>
+              <a:t> in </a:t>
+            </a:r>
+            <a:r>
+              <a:rPr lang="sv-SE" dirty="0" err="1"/>
+              <a:t>accuracy</a:t>
+            </a:r>
+            <a:r>
+              <a:rPr lang="sv-SE" dirty="0"/>
+              <a:t>?</a:t>
+            </a:r>
+          </a:p>
+        </p:txBody>
+      </p:sp>
+    </p:spTree>
+    <p:extLst>
+      <p:ext uri="{BB962C8B-B14F-4D97-AF65-F5344CB8AC3E}">
+        <p14:creationId xmlns:p14="http://schemas.microsoft.com/office/powerpoint/2010/main" val="3208155930"/>
+      </p:ext>
+    </p:extLst>
+  </p:cSld>
+  <p:clrMapOvr>
+    <a:masterClrMapping/>
+  </p:clrMapOvr>
+</p:sld>
+</file>
+
+<file path=ppt/slides/slide11.xml><?xml version="1.0" encoding="utf-8"?>
+<p:sld xmlns:a="http://schemas.openxmlformats.org/drawingml/2006/main" xmlns:r="http://schemas.openxmlformats.org/officeDocument/2006/relationships" xmlns:p="http://schemas.openxmlformats.org/presentationml/2006/main">
+  <p:cSld>
+    <p:spTree>
+      <p:nvGrpSpPr>
+        <p:cNvPr id="1" name=""/>
+        <p:cNvGrpSpPr/>
+        <p:nvPr/>
+      </p:nvGrpSpPr>
+      <p:grpSpPr>
+        <a:xfrm>
+          <a:off x="0" y="0"/>
+          <a:ext cx="0" cy="0"/>
+          <a:chOff x="0" y="0"/>
+          <a:chExt cx="0" cy="0"/>
+        </a:xfrm>
+      </p:grpSpPr>
+      <p:sp>
+        <p:nvSpPr>
+          <p:cNvPr id="2" name="Rubrik 1">
+            <a:extLst>
+              <a:ext uri="{FF2B5EF4-FFF2-40B4-BE49-F238E27FC236}">
+                <a16:creationId xmlns:a16="http://schemas.microsoft.com/office/drawing/2014/main" id="{8C6C45F7-0CDD-CB40-B90F-66F443EFF8B8}"/>
+              </a:ext>
+            </a:extLst>
+          </p:cNvPr>
+          <p:cNvSpPr>
+            <a:spLocks noGrp="1"/>
+          </p:cNvSpPr>
+          <p:nvPr>
+            <p:ph type="title"/>
+          </p:nvPr>
+        </p:nvSpPr>
+        <p:spPr/>
+        <p:txBody>
+          <a:bodyPr/>
+          <a:lstStyle/>
+          <a:p>
+            <a:r>
+              <a:rPr lang="sv-SE" dirty="0" err="1"/>
+              <a:t>Assignment</a:t>
+            </a:r>
+            <a:r>
+              <a:rPr lang="sv-SE" dirty="0"/>
+              <a:t> 6: Decision </a:t>
+            </a:r>
+            <a:r>
+              <a:rPr lang="sv-SE" dirty="0" err="1"/>
+              <a:t>tree</a:t>
+            </a:r>
+            <a:r>
+              <a:rPr lang="sv-SE" dirty="0"/>
+              <a:t> </a:t>
+            </a:r>
+            <a:r>
+              <a:rPr lang="sv-SE" dirty="0" err="1"/>
+              <a:t>Vowels</a:t>
+            </a:r>
+            <a:endParaRPr lang="sv-SE" dirty="0"/>
+          </a:p>
+        </p:txBody>
+      </p:sp>
+      <p:pic>
+        <p:nvPicPr>
+          <p:cNvPr id="4" name="Platshållare för innehåll 3">
+            <a:extLst>
+              <a:ext uri="{FF2B5EF4-FFF2-40B4-BE49-F238E27FC236}">
+                <a16:creationId xmlns:a16="http://schemas.microsoft.com/office/drawing/2014/main" id="{DFD1F6B7-AB19-3F42-A0D9-A4E9BD4DBFAA}"/>
+              </a:ext>
+            </a:extLst>
+          </p:cNvPr>
+          <p:cNvPicPr>
+            <a:picLocks noGrp="1" noChangeAspect="1"/>
+          </p:cNvPicPr>
+          <p:nvPr>
+            <p:ph idx="1"/>
+          </p:nvPr>
+        </p:nvPicPr>
+        <p:blipFill>
+          <a:blip r:embed="rId2"/>
+          <a:stretch>
+            <a:fillRect/>
+          </a:stretch>
+        </p:blipFill>
+        <p:spPr>
+          <a:xfrm>
+            <a:off x="5522913" y="1927225"/>
+            <a:ext cx="6057900" cy="1993900"/>
+          </a:xfrm>
+          <a:prstGeom prst="rect">
+            <a:avLst/>
+          </a:prstGeom>
+        </p:spPr>
+      </p:pic>
+      <p:pic>
+        <p:nvPicPr>
+          <p:cNvPr id="5" name="Bildobjekt 4">
+            <a:extLst>
+              <a:ext uri="{FF2B5EF4-FFF2-40B4-BE49-F238E27FC236}">
+                <a16:creationId xmlns:a16="http://schemas.microsoft.com/office/drawing/2014/main" id="{C991C5C3-18D9-7043-A498-9F1DBE6AB6F2}"/>
+              </a:ext>
+            </a:extLst>
+          </p:cNvPr>
+          <p:cNvPicPr>
+            <a:picLocks noChangeAspect="1"/>
+          </p:cNvPicPr>
+          <p:nvPr/>
+        </p:nvPicPr>
+        <p:blipFill>
+          <a:blip r:embed="rId3"/>
+          <a:stretch>
+            <a:fillRect/>
+          </a:stretch>
+        </p:blipFill>
+        <p:spPr>
+          <a:xfrm>
+            <a:off x="5522913" y="4157662"/>
+            <a:ext cx="6032500" cy="2019300"/>
+          </a:xfrm>
+          <a:prstGeom prst="rect">
+            <a:avLst/>
+          </a:prstGeom>
+        </p:spPr>
+      </p:pic>
+      <p:sp>
+        <p:nvSpPr>
+          <p:cNvPr id="6" name="textruta 5">
+            <a:extLst>
+              <a:ext uri="{FF2B5EF4-FFF2-40B4-BE49-F238E27FC236}">
+                <a16:creationId xmlns:a16="http://schemas.microsoft.com/office/drawing/2014/main" id="{F284B1A3-67B2-1148-839D-D787E40A7BA0}"/>
+              </a:ext>
+            </a:extLst>
+          </p:cNvPr>
+          <p:cNvSpPr txBox="1"/>
+          <p:nvPr/>
+        </p:nvSpPr>
+        <p:spPr>
+          <a:xfrm>
+            <a:off x="2900363" y="2814638"/>
+            <a:ext cx="1412310" cy="369332"/>
+          </a:xfrm>
+          <a:prstGeom prst="rect">
+            <a:avLst/>
+          </a:prstGeom>
+          <a:noFill/>
+        </p:spPr>
+        <p:txBody>
+          <a:bodyPr wrap="none" rtlCol="0">
+            <a:spAutoFit/>
+          </a:bodyPr>
+          <a:lstStyle/>
+          <a:p>
+            <a:r>
+              <a:rPr lang="sv-SE" dirty="0"/>
+              <a:t>Not </a:t>
+            </a:r>
+            <a:r>
+              <a:rPr lang="sv-SE" dirty="0" err="1"/>
+              <a:t>boosted</a:t>
+            </a:r>
+            <a:r>
+              <a:rPr lang="sv-SE" dirty="0"/>
+              <a:t>:</a:t>
+            </a:r>
+          </a:p>
+        </p:txBody>
+      </p:sp>
+      <p:sp>
+        <p:nvSpPr>
+          <p:cNvPr id="7" name="textruta 6">
+            <a:extLst>
+              <a:ext uri="{FF2B5EF4-FFF2-40B4-BE49-F238E27FC236}">
+                <a16:creationId xmlns:a16="http://schemas.microsoft.com/office/drawing/2014/main" id="{BBA9CEEC-472B-F143-BD33-645BFA8D279B}"/>
+              </a:ext>
+            </a:extLst>
+          </p:cNvPr>
+          <p:cNvSpPr txBox="1"/>
+          <p:nvPr/>
+        </p:nvSpPr>
+        <p:spPr>
+          <a:xfrm>
+            <a:off x="2900363" y="4797980"/>
+            <a:ext cx="1014765" cy="369332"/>
+          </a:xfrm>
+          <a:prstGeom prst="rect">
+            <a:avLst/>
+          </a:prstGeom>
+          <a:noFill/>
+        </p:spPr>
+        <p:txBody>
+          <a:bodyPr wrap="none" rtlCol="0">
+            <a:spAutoFit/>
+          </a:bodyPr>
+          <a:lstStyle/>
+          <a:p>
+            <a:r>
+              <a:rPr lang="sv-SE" dirty="0" err="1"/>
+              <a:t>Boosted</a:t>
+            </a:r>
+            <a:r>
+              <a:rPr lang="sv-SE" dirty="0"/>
+              <a:t>:</a:t>
+            </a:r>
+          </a:p>
+        </p:txBody>
+      </p:sp>
+      <p:sp>
+        <p:nvSpPr>
+          <p:cNvPr id="8" name="textruta 7">
+            <a:extLst>
+              <a:ext uri="{FF2B5EF4-FFF2-40B4-BE49-F238E27FC236}">
+                <a16:creationId xmlns:a16="http://schemas.microsoft.com/office/drawing/2014/main" id="{CE1C5B15-6BEB-FE4E-940D-3480B321CAC0}"/>
+              </a:ext>
+            </a:extLst>
+          </p:cNvPr>
+          <p:cNvSpPr txBox="1"/>
+          <p:nvPr/>
+        </p:nvSpPr>
+        <p:spPr>
+          <a:xfrm>
+            <a:off x="743007" y="1690688"/>
+            <a:ext cx="2663486" cy="369332"/>
+          </a:xfrm>
+          <a:prstGeom prst="rect">
+            <a:avLst/>
+          </a:prstGeom>
+          <a:noFill/>
+        </p:spPr>
+        <p:txBody>
+          <a:bodyPr wrap="none" rtlCol="0">
+            <a:spAutoFit/>
+          </a:bodyPr>
+          <a:lstStyle/>
+          <a:p>
+            <a:r>
+              <a:rPr lang="sv-SE" dirty="0" err="1"/>
+              <a:t>Improvement</a:t>
+            </a:r>
+            <a:r>
+              <a:rPr lang="sv-SE" dirty="0"/>
+              <a:t> in </a:t>
+            </a:r>
+            <a:r>
+              <a:rPr lang="sv-SE" dirty="0" err="1"/>
+              <a:t>accuracy</a:t>
+            </a:r>
+            <a:r>
+              <a:rPr lang="sv-SE" dirty="0"/>
+              <a:t>?</a:t>
+            </a:r>
+          </a:p>
+        </p:txBody>
+      </p:sp>
+    </p:spTree>
+    <p:extLst>
+      <p:ext uri="{BB962C8B-B14F-4D97-AF65-F5344CB8AC3E}">
+        <p14:creationId xmlns:p14="http://schemas.microsoft.com/office/powerpoint/2010/main" val="2638951446"/>
+      </p:ext>
+    </p:extLst>
+  </p:cSld>
+  <p:clrMapOvr>
+    <a:masterClrMapping/>
+  </p:clrMapOvr>
+</p:sld>
+</file>
+
+<file path=ppt/slides/slide12.xml><?xml version="1.0" encoding="utf-8"?>
+<p:sld xmlns:a="http://schemas.openxmlformats.org/drawingml/2006/main" xmlns:r="http://schemas.openxmlformats.org/officeDocument/2006/relationships" xmlns:p="http://schemas.openxmlformats.org/presentationml/2006/main">
+  <p:cSld>
+    <p:spTree>
+      <p:nvGrpSpPr>
+        <p:cNvPr id="1" name=""/>
+        <p:cNvGrpSpPr/>
+        <p:nvPr/>
+      </p:nvGrpSpPr>
+      <p:grpSpPr>
+        <a:xfrm>
+          <a:off x="0" y="0"/>
+          <a:ext cx="0" cy="0"/>
+          <a:chOff x="0" y="0"/>
+          <a:chExt cx="0" cy="0"/>
+        </a:xfrm>
+      </p:grpSpPr>
+      <p:sp>
+        <p:nvSpPr>
+          <p:cNvPr id="2" name="Rubrik 1">
+            <a:extLst>
+              <a:ext uri="{FF2B5EF4-FFF2-40B4-BE49-F238E27FC236}">
+                <a16:creationId xmlns:a16="http://schemas.microsoft.com/office/drawing/2014/main" id="{A9183794-45BB-F64F-A648-EBF74D78B553}"/>
+              </a:ext>
+            </a:extLst>
+          </p:cNvPr>
+          <p:cNvSpPr>
+            <a:spLocks noGrp="1"/>
+          </p:cNvSpPr>
+          <p:nvPr>
+            <p:ph type="title"/>
+          </p:nvPr>
+        </p:nvSpPr>
+        <p:spPr/>
+        <p:txBody>
+          <a:bodyPr/>
+          <a:lstStyle/>
+          <a:p>
+            <a:r>
+              <a:rPr lang="sv-SE" dirty="0" err="1"/>
+              <a:t>Assignment</a:t>
+            </a:r>
+            <a:r>
+              <a:rPr lang="sv-SE" dirty="0"/>
+              <a:t> 6: Decision </a:t>
+            </a:r>
+            <a:r>
+              <a:rPr lang="sv-SE" dirty="0" err="1"/>
+              <a:t>tree</a:t>
+            </a:r>
+            <a:r>
+              <a:rPr lang="sv-SE" dirty="0"/>
+              <a:t> </a:t>
+            </a:r>
+            <a:r>
+              <a:rPr lang="sv-SE" dirty="0" err="1"/>
+              <a:t>boosted</a:t>
+            </a:r>
+            <a:r>
+              <a:rPr lang="sv-SE" dirty="0"/>
+              <a:t> iris </a:t>
+            </a:r>
+            <a:r>
+              <a:rPr lang="sv-SE" dirty="0" err="1"/>
+              <a:t>boundries</a:t>
+            </a:r>
+            <a:endParaRPr lang="sv-SE" dirty="0"/>
+          </a:p>
+        </p:txBody>
+      </p:sp>
+      <p:pic>
+        <p:nvPicPr>
+          <p:cNvPr id="4" name="Platshållare för innehåll 3">
+            <a:extLst>
+              <a:ext uri="{FF2B5EF4-FFF2-40B4-BE49-F238E27FC236}">
+                <a16:creationId xmlns:a16="http://schemas.microsoft.com/office/drawing/2014/main" id="{684BAAC5-3C02-3F4F-A47C-6DA1473954B2}"/>
+              </a:ext>
+            </a:extLst>
+          </p:cNvPr>
+          <p:cNvPicPr>
+            <a:picLocks noGrp="1" noChangeAspect="1"/>
+          </p:cNvPicPr>
+          <p:nvPr>
+            <p:ph idx="1"/>
+          </p:nvPr>
+        </p:nvPicPr>
+        <p:blipFill>
+          <a:blip r:embed="rId2"/>
+          <a:stretch>
+            <a:fillRect/>
+          </a:stretch>
+        </p:blipFill>
+        <p:spPr>
+          <a:xfrm>
+            <a:off x="838200" y="1825625"/>
+            <a:ext cx="5604892" cy="4338638"/>
+          </a:xfrm>
+          <a:prstGeom prst="rect">
+            <a:avLst/>
+          </a:prstGeom>
+        </p:spPr>
+      </p:pic>
+      <p:pic>
+        <p:nvPicPr>
+          <p:cNvPr id="5" name="Bildobjekt 4">
+            <a:extLst>
+              <a:ext uri="{FF2B5EF4-FFF2-40B4-BE49-F238E27FC236}">
+                <a16:creationId xmlns:a16="http://schemas.microsoft.com/office/drawing/2014/main" id="{B4D0BF11-4B2B-5048-B047-E59D6D106963}"/>
+              </a:ext>
+            </a:extLst>
+          </p:cNvPr>
+          <p:cNvPicPr>
+            <a:picLocks noChangeAspect="1"/>
+          </p:cNvPicPr>
+          <p:nvPr/>
+        </p:nvPicPr>
+        <p:blipFill>
+          <a:blip r:embed="rId3"/>
+          <a:stretch>
+            <a:fillRect/>
+          </a:stretch>
+        </p:blipFill>
+        <p:spPr>
+          <a:xfrm>
+            <a:off x="6459498" y="1812925"/>
+            <a:ext cx="5714173" cy="4351338"/>
+          </a:xfrm>
+          <a:prstGeom prst="rect">
+            <a:avLst/>
+          </a:prstGeom>
+        </p:spPr>
+      </p:pic>
+      <p:sp>
+        <p:nvSpPr>
+          <p:cNvPr id="6" name="textruta 5">
+            <a:extLst>
+              <a:ext uri="{FF2B5EF4-FFF2-40B4-BE49-F238E27FC236}">
+                <a16:creationId xmlns:a16="http://schemas.microsoft.com/office/drawing/2014/main" id="{1908FCAC-5978-DB4D-9244-5EF068A2F578}"/>
+              </a:ext>
+            </a:extLst>
+          </p:cNvPr>
+          <p:cNvSpPr txBox="1"/>
+          <p:nvPr/>
+        </p:nvSpPr>
+        <p:spPr>
+          <a:xfrm>
+            <a:off x="838200" y="1687513"/>
+            <a:ext cx="8420190" cy="369332"/>
+          </a:xfrm>
+          <a:prstGeom prst="rect">
+            <a:avLst/>
+          </a:prstGeom>
+          <a:noFill/>
+        </p:spPr>
+        <p:txBody>
+          <a:bodyPr wrap="none" rtlCol="0">
+            <a:spAutoFit/>
+          </a:bodyPr>
+          <a:lstStyle/>
+          <a:p>
+            <a:r>
+              <a:rPr lang="sv-SE" dirty="0" err="1"/>
+              <a:t>What</a:t>
+            </a:r>
+            <a:r>
+              <a:rPr lang="sv-SE" dirty="0"/>
+              <a:t> </a:t>
+            </a:r>
+            <a:r>
+              <a:rPr lang="sv-SE" dirty="0" err="1"/>
+              <a:t>differences</a:t>
+            </a:r>
+            <a:r>
+              <a:rPr lang="sv-SE" dirty="0"/>
+              <a:t> do </a:t>
+            </a:r>
+            <a:r>
+              <a:rPr lang="sv-SE" dirty="0" err="1"/>
+              <a:t>you</a:t>
+            </a:r>
+            <a:r>
+              <a:rPr lang="sv-SE" dirty="0"/>
+              <a:t> </a:t>
+            </a:r>
+            <a:r>
+              <a:rPr lang="sv-SE" dirty="0" err="1"/>
+              <a:t>notice</a:t>
+            </a:r>
+            <a:r>
+              <a:rPr lang="sv-SE" dirty="0"/>
+              <a:t>? Is the </a:t>
+            </a:r>
+            <a:r>
+              <a:rPr lang="sv-SE" dirty="0" err="1"/>
+              <a:t>boundary</a:t>
+            </a:r>
+            <a:r>
+              <a:rPr lang="sv-SE" dirty="0"/>
+              <a:t> </a:t>
+            </a:r>
+            <a:r>
+              <a:rPr lang="sv-SE" dirty="0" err="1"/>
+              <a:t>of</a:t>
+            </a:r>
+            <a:r>
+              <a:rPr lang="sv-SE" dirty="0"/>
+              <a:t> the </a:t>
+            </a:r>
+            <a:r>
+              <a:rPr lang="sv-SE" dirty="0" err="1"/>
+              <a:t>boosted</a:t>
+            </a:r>
+            <a:r>
+              <a:rPr lang="sv-SE" dirty="0"/>
+              <a:t> version </a:t>
+            </a:r>
+            <a:r>
+              <a:rPr lang="sv-SE" dirty="0" err="1"/>
+              <a:t>more</a:t>
+            </a:r>
+            <a:r>
+              <a:rPr lang="sv-SE" dirty="0"/>
+              <a:t> </a:t>
+            </a:r>
+            <a:r>
+              <a:rPr lang="sv-SE" dirty="0" err="1"/>
+              <a:t>complex</a:t>
+            </a:r>
+            <a:r>
+              <a:rPr lang="sv-SE" dirty="0"/>
+              <a:t>?</a:t>
+            </a:r>
+          </a:p>
+        </p:txBody>
+      </p:sp>
+    </p:spTree>
+    <p:extLst>
+      <p:ext uri="{BB962C8B-B14F-4D97-AF65-F5344CB8AC3E}">
+        <p14:creationId xmlns:p14="http://schemas.microsoft.com/office/powerpoint/2010/main" val="3835629337"/>
+      </p:ext>
+    </p:extLst>
+  </p:cSld>
+  <p:clrMapOvr>
+    <a:masterClrMapping/>
+  </p:clrMapOvr>
+</p:sld>
+</file>
+
+<file path=ppt/slides/slide13.xml><?xml version="1.0" encoding="utf-8"?>
+<p:sld xmlns:a="http://schemas.openxmlformats.org/drawingml/2006/main" xmlns:r="http://schemas.openxmlformats.org/officeDocument/2006/relationships" xmlns:p="http://schemas.openxmlformats.org/presentationml/2006/main">
+  <p:cSld>
+    <p:spTree>
+      <p:nvGrpSpPr>
+        <p:cNvPr id="1" name=""/>
+        <p:cNvGrpSpPr/>
+        <p:nvPr/>
+      </p:nvGrpSpPr>
+      <p:grpSpPr>
+        <a:xfrm>
+          <a:off x="0" y="0"/>
+          <a:ext cx="0" cy="0"/>
+          <a:chOff x="0" y="0"/>
+          <a:chExt cx="0" cy="0"/>
+        </a:xfrm>
+      </p:grpSpPr>
+      <p:sp>
+        <p:nvSpPr>
+          <p:cNvPr id="2" name="Rubrik 1">
+            <a:extLst>
+              <a:ext uri="{FF2B5EF4-FFF2-40B4-BE49-F238E27FC236}">
+                <a16:creationId xmlns:a16="http://schemas.microsoft.com/office/drawing/2014/main" id="{6F6C563E-335F-E54C-A43E-7F581881059F}"/>
+              </a:ext>
+            </a:extLst>
+          </p:cNvPr>
+          <p:cNvSpPr>
+            <a:spLocks noGrp="1"/>
+          </p:cNvSpPr>
+          <p:nvPr>
+            <p:ph type="title"/>
+          </p:nvPr>
+        </p:nvSpPr>
+        <p:spPr/>
+        <p:txBody>
+          <a:bodyPr/>
+          <a:lstStyle/>
+          <a:p>
+            <a:r>
+              <a:rPr lang="sv-SE" dirty="0" err="1"/>
+              <a:t>Assignment</a:t>
+            </a:r>
+            <a:r>
+              <a:rPr lang="sv-SE" dirty="0"/>
+              <a:t> 6: </a:t>
+            </a:r>
+            <a:r>
+              <a:rPr lang="sv-SE" dirty="0" err="1"/>
+              <a:t>Questions</a:t>
+            </a:r>
+            <a:endParaRPr lang="sv-SE" dirty="0"/>
+          </a:p>
+        </p:txBody>
+      </p:sp>
+      <p:sp>
+        <p:nvSpPr>
+          <p:cNvPr id="3" name="Platshållare för innehåll 2">
+            <a:extLst>
+              <a:ext uri="{FF2B5EF4-FFF2-40B4-BE49-F238E27FC236}">
+                <a16:creationId xmlns:a16="http://schemas.microsoft.com/office/drawing/2014/main" id="{03CDE606-4EAE-FC4E-BBF0-6BFA40794A10}"/>
+              </a:ext>
+            </a:extLst>
+          </p:cNvPr>
+          <p:cNvSpPr>
+            <a:spLocks noGrp="1"/>
+          </p:cNvSpPr>
+          <p:nvPr>
+            <p:ph idx="1"/>
+          </p:nvPr>
+        </p:nvSpPr>
+        <p:spPr/>
+        <p:txBody>
+          <a:bodyPr/>
+          <a:lstStyle/>
+          <a:p>
+            <a:pPr marL="0" indent="0">
+              <a:buNone/>
+            </a:pPr>
+            <a:r>
+              <a:rPr lang="sv-SE" sz="2000" dirty="0" err="1"/>
+              <a:t>Can</a:t>
+            </a:r>
+            <a:r>
+              <a:rPr lang="sv-SE" sz="2000" dirty="0"/>
+              <a:t> </a:t>
+            </a:r>
+            <a:r>
+              <a:rPr lang="sv-SE" sz="2000" dirty="0" err="1"/>
+              <a:t>we</a:t>
+            </a:r>
+            <a:r>
+              <a:rPr lang="sv-SE" sz="2000" dirty="0"/>
+              <a:t> make </a:t>
+            </a:r>
+            <a:r>
+              <a:rPr lang="sv-SE" sz="2000" dirty="0" err="1"/>
+              <a:t>up</a:t>
+            </a:r>
+            <a:r>
+              <a:rPr lang="sv-SE" sz="2000" dirty="0"/>
+              <a:t> for not </a:t>
+            </a:r>
+            <a:r>
+              <a:rPr lang="sv-SE" sz="2000" dirty="0" err="1"/>
+              <a:t>using</a:t>
+            </a:r>
+            <a:r>
+              <a:rPr lang="sv-SE" sz="2000" dirty="0"/>
+              <a:t> a </a:t>
+            </a:r>
+            <a:r>
+              <a:rPr lang="sv-SE" sz="2000" dirty="0" err="1"/>
+              <a:t>more</a:t>
+            </a:r>
+            <a:r>
+              <a:rPr lang="sv-SE" sz="2000" dirty="0"/>
+              <a:t> </a:t>
+            </a:r>
+            <a:r>
+              <a:rPr lang="sv-SE" sz="2000" dirty="0" err="1"/>
+              <a:t>advanced</a:t>
+            </a:r>
+            <a:r>
+              <a:rPr lang="sv-SE" sz="2000" dirty="0"/>
+              <a:t> </a:t>
+            </a:r>
+            <a:r>
+              <a:rPr lang="sv-SE" sz="2000" dirty="0" err="1"/>
+              <a:t>model</a:t>
+            </a:r>
+            <a:r>
+              <a:rPr lang="sv-SE" sz="2000" dirty="0"/>
+              <a:t> in the </a:t>
+            </a:r>
+            <a:r>
+              <a:rPr lang="sv-SE" sz="2000" dirty="0" err="1"/>
+              <a:t>basic</a:t>
+            </a:r>
+            <a:r>
+              <a:rPr lang="sv-SE" sz="2000" dirty="0"/>
+              <a:t> </a:t>
+            </a:r>
+            <a:r>
+              <a:rPr lang="sv-SE" sz="2000" dirty="0" err="1"/>
+              <a:t>classifier</a:t>
+            </a:r>
+            <a:r>
+              <a:rPr lang="sv-SE" sz="2000" dirty="0"/>
+              <a:t> by </a:t>
+            </a:r>
+            <a:r>
+              <a:rPr lang="sv-SE" sz="2000" dirty="0" err="1"/>
+              <a:t>using</a:t>
+            </a:r>
+            <a:r>
+              <a:rPr lang="sv-SE" sz="2000" dirty="0"/>
+              <a:t> </a:t>
+            </a:r>
+            <a:r>
+              <a:rPr lang="sv-SE" sz="2000" dirty="0" err="1"/>
+              <a:t>boosting</a:t>
+            </a:r>
+            <a:r>
+              <a:rPr lang="sv-SE" sz="2000" dirty="0"/>
+              <a:t>?</a:t>
+            </a:r>
+          </a:p>
+          <a:p>
+            <a:pPr marL="457200" indent="-457200">
+              <a:buFont typeface="+mj-lt"/>
+              <a:buAutoNum type="arabicPeriod"/>
+            </a:pPr>
+            <a:endParaRPr lang="sv-SE" sz="2000" dirty="0"/>
+          </a:p>
+          <a:p>
+            <a:pPr marL="0" indent="0">
+              <a:buNone/>
+            </a:pPr>
+            <a:r>
+              <a:rPr lang="sv-SE" sz="2000" dirty="0" err="1"/>
+              <a:t>Yes</a:t>
+            </a:r>
+            <a:r>
+              <a:rPr lang="sv-SE" sz="2000" dirty="0"/>
+              <a:t>! </a:t>
+            </a:r>
+            <a:r>
+              <a:rPr lang="sv-SE" sz="2000" dirty="0" err="1"/>
+              <a:t>We</a:t>
+            </a:r>
+            <a:r>
+              <a:rPr lang="sv-SE" sz="2000" dirty="0"/>
+              <a:t> </a:t>
+            </a:r>
+            <a:r>
+              <a:rPr lang="sv-SE" sz="2000" dirty="0" err="1"/>
+              <a:t>can</a:t>
+            </a:r>
+            <a:r>
+              <a:rPr lang="sv-SE" sz="2000" dirty="0"/>
+              <a:t> </a:t>
+            </a:r>
+            <a:r>
+              <a:rPr lang="sv-SE" sz="2000" dirty="0" err="1"/>
+              <a:t>use</a:t>
+            </a:r>
+            <a:r>
+              <a:rPr lang="sv-SE" sz="2000" dirty="0"/>
+              <a:t> </a:t>
+            </a:r>
+            <a:r>
+              <a:rPr lang="sv-SE" sz="2000" dirty="0" err="1"/>
+              <a:t>Adaboosting</a:t>
+            </a:r>
+            <a:r>
+              <a:rPr lang="sv-SE" sz="2000" dirty="0"/>
+              <a:t> for </a:t>
+            </a:r>
+            <a:r>
+              <a:rPr lang="sv-SE" sz="2000" dirty="0" err="1"/>
+              <a:t>weak</a:t>
+            </a:r>
+            <a:r>
+              <a:rPr lang="sv-SE" sz="2000" dirty="0"/>
+              <a:t> </a:t>
+            </a:r>
+            <a:r>
+              <a:rPr lang="sv-SE" sz="2000" dirty="0" err="1"/>
+              <a:t>classifiers</a:t>
+            </a:r>
+            <a:r>
+              <a:rPr lang="sv-SE" sz="2000" dirty="0"/>
+              <a:t> </a:t>
+            </a:r>
+            <a:r>
+              <a:rPr lang="sv-SE" sz="2000" dirty="0" err="1"/>
+              <a:t>with</a:t>
+            </a:r>
+            <a:r>
+              <a:rPr lang="sv-SE" sz="2000" dirty="0"/>
+              <a:t> </a:t>
+            </a:r>
+            <a:r>
+              <a:rPr lang="sv-SE" sz="2000" dirty="0" err="1"/>
+              <a:t>error</a:t>
+            </a:r>
+            <a:r>
+              <a:rPr lang="sv-SE" sz="2000" dirty="0"/>
+              <a:t> less </a:t>
+            </a:r>
+            <a:r>
+              <a:rPr lang="sv-SE" sz="2000" dirty="0" err="1"/>
+              <a:t>than</a:t>
+            </a:r>
+            <a:r>
+              <a:rPr lang="sv-SE" sz="2000" dirty="0"/>
+              <a:t> 50%</a:t>
+            </a:r>
+          </a:p>
+          <a:p>
+            <a:pPr marL="0" indent="0">
+              <a:buNone/>
+            </a:pPr>
+            <a:endParaRPr lang="sv-SE" sz="2000" dirty="0"/>
+          </a:p>
+        </p:txBody>
+      </p:sp>
+    </p:spTree>
+    <p:extLst>
+      <p:ext uri="{BB962C8B-B14F-4D97-AF65-F5344CB8AC3E}">
+        <p14:creationId xmlns:p14="http://schemas.microsoft.com/office/powerpoint/2010/main" val="1506434157"/>
+      </p:ext>
+    </p:extLst>
+  </p:cSld>
+  <p:clrMapOvr>
+    <a:masterClrMapping/>
+  </p:clrMapOvr>
+</p:sld>
+</file>
+
+<file path=ppt/slides/slide14.xml><?xml version="1.0" encoding="utf-8"?>
+<p:sld xmlns:a="http://schemas.openxmlformats.org/drawingml/2006/main" xmlns:r="http://schemas.openxmlformats.org/officeDocument/2006/relationships" xmlns:p="http://schemas.openxmlformats.org/presentationml/2006/main">
+  <p:cSld>
+    <p:spTree>
+      <p:nvGrpSpPr>
+        <p:cNvPr id="1" name=""/>
+        <p:cNvGrpSpPr/>
+        <p:nvPr/>
+      </p:nvGrpSpPr>
+      <p:grpSpPr>
+        <a:xfrm>
+          <a:off x="0" y="0"/>
+          <a:ext cx="0" cy="0"/>
+          <a:chOff x="0" y="0"/>
+          <a:chExt cx="0" cy="0"/>
+        </a:xfrm>
+      </p:grpSpPr>
+      <p:sp>
+        <p:nvSpPr>
+          <p:cNvPr id="2" name="Rubrik 1">
+            <a:extLst>
+              <a:ext uri="{FF2B5EF4-FFF2-40B4-BE49-F238E27FC236}">
+                <a16:creationId xmlns:a16="http://schemas.microsoft.com/office/drawing/2014/main" id="{182CB088-31F5-7E4C-866B-C556FB791B92}"/>
+              </a:ext>
+            </a:extLst>
+          </p:cNvPr>
+          <p:cNvSpPr>
+            <a:spLocks noGrp="1"/>
+          </p:cNvSpPr>
+          <p:nvPr>
+            <p:ph type="title"/>
+          </p:nvPr>
+        </p:nvSpPr>
+        <p:spPr/>
+        <p:txBody>
+          <a:bodyPr/>
+          <a:lstStyle/>
+          <a:p>
+            <a:r>
+              <a:rPr lang="sv-SE" dirty="0" err="1"/>
+              <a:t>Assignment</a:t>
+            </a:r>
+            <a:r>
+              <a:rPr lang="sv-SE" dirty="0"/>
+              <a:t> 7:</a:t>
+            </a:r>
+          </a:p>
+        </p:txBody>
+      </p:sp>
+      <p:sp>
+        <p:nvSpPr>
+          <p:cNvPr id="3" name="Platshållare för innehåll 2">
+            <a:extLst>
+              <a:ext uri="{FF2B5EF4-FFF2-40B4-BE49-F238E27FC236}">
+                <a16:creationId xmlns:a16="http://schemas.microsoft.com/office/drawing/2014/main" id="{A0EC1CAE-5106-CD47-A166-8B94670B79ED}"/>
+              </a:ext>
+            </a:extLst>
+          </p:cNvPr>
+          <p:cNvSpPr>
+            <a:spLocks noGrp="1"/>
+          </p:cNvSpPr>
+          <p:nvPr>
+            <p:ph idx="1"/>
+          </p:nvPr>
+        </p:nvSpPr>
+        <p:spPr>
+          <a:xfrm>
+            <a:off x="838200" y="1554161"/>
+            <a:ext cx="10515600" cy="5489576"/>
+          </a:xfrm>
+        </p:spPr>
+        <p:txBody>
+          <a:bodyPr>
+            <a:normAutofit/>
+          </a:bodyPr>
+          <a:lstStyle/>
+          <a:p>
+            <a:pPr marL="0" indent="0">
+              <a:buNone/>
+            </a:pPr>
+            <a:r>
+              <a:rPr lang="sv-SE" sz="2000" b="1" dirty="0" err="1"/>
+              <a:t>Outliers</a:t>
+            </a:r>
+            <a:r>
+              <a:rPr lang="sv-SE" sz="2000" b="1" dirty="0"/>
+              <a:t>: </a:t>
+            </a:r>
+            <a:r>
+              <a:rPr lang="sv-SE" sz="2000" dirty="0" err="1"/>
+              <a:t>Boosted</a:t>
+            </a:r>
+            <a:r>
+              <a:rPr lang="sv-SE" sz="2000" dirty="0"/>
+              <a:t> </a:t>
+            </a:r>
+            <a:r>
+              <a:rPr lang="sv-SE" sz="2000" dirty="0" err="1"/>
+              <a:t>algorithm</a:t>
+            </a:r>
+            <a:r>
+              <a:rPr lang="sv-SE" sz="2000" dirty="0"/>
+              <a:t> </a:t>
+            </a:r>
+            <a:r>
+              <a:rPr lang="sv-SE" sz="2000" dirty="0" err="1"/>
+              <a:t>are</a:t>
+            </a:r>
+            <a:r>
+              <a:rPr lang="sv-SE" sz="2000" dirty="0"/>
+              <a:t> sensitive to </a:t>
+            </a:r>
+            <a:r>
+              <a:rPr lang="sv-SE" sz="2000" dirty="0" err="1"/>
+              <a:t>outliers</a:t>
+            </a:r>
+            <a:r>
+              <a:rPr lang="sv-SE" sz="2000" dirty="0"/>
+              <a:t> </a:t>
+            </a:r>
+            <a:r>
+              <a:rPr lang="sv-SE" sz="2000" dirty="0" err="1"/>
+              <a:t>since</a:t>
+            </a:r>
+            <a:r>
+              <a:rPr lang="sv-SE" sz="2000" dirty="0"/>
+              <a:t> </a:t>
+            </a:r>
+            <a:r>
+              <a:rPr lang="sv-SE" sz="2000" dirty="0" err="1"/>
+              <a:t>they</a:t>
+            </a:r>
+            <a:r>
+              <a:rPr lang="sv-SE" sz="2000" dirty="0"/>
+              <a:t> </a:t>
+            </a:r>
+            <a:r>
+              <a:rPr lang="sv-SE" sz="2000" dirty="0" err="1"/>
+              <a:t>will</a:t>
+            </a:r>
+            <a:r>
+              <a:rPr lang="sv-SE" sz="2000" dirty="0"/>
+              <a:t> </a:t>
+            </a:r>
+            <a:r>
+              <a:rPr lang="sv-SE" sz="2000" dirty="0" err="1"/>
+              <a:t>often</a:t>
+            </a:r>
+            <a:r>
+              <a:rPr lang="sv-SE" sz="2000" dirty="0"/>
+              <a:t> be </a:t>
+            </a:r>
+            <a:r>
+              <a:rPr lang="sv-SE" sz="2000" dirty="0" err="1"/>
+              <a:t>missclassified</a:t>
+            </a:r>
+            <a:r>
+              <a:rPr lang="sv-SE" sz="2000" dirty="0"/>
+              <a:t> and </a:t>
+            </a:r>
+            <a:r>
+              <a:rPr lang="sv-SE" sz="2000" dirty="0" err="1"/>
+              <a:t>thus</a:t>
+            </a:r>
+            <a:r>
+              <a:rPr lang="sv-SE" sz="2000" dirty="0"/>
+              <a:t> </a:t>
+            </a:r>
+            <a:r>
+              <a:rPr lang="sv-SE" sz="2000" dirty="0" err="1"/>
+              <a:t>gain</a:t>
+            </a:r>
+            <a:r>
+              <a:rPr lang="sv-SE" sz="2000" dirty="0"/>
+              <a:t> a </a:t>
+            </a:r>
+            <a:r>
+              <a:rPr lang="sv-SE" sz="2000" dirty="0" err="1"/>
+              <a:t>higher</a:t>
+            </a:r>
+            <a:r>
+              <a:rPr lang="sv-SE" sz="2000" dirty="0"/>
+              <a:t> </a:t>
+            </a:r>
+            <a:r>
+              <a:rPr lang="sv-SE" sz="2000" dirty="0" err="1"/>
+              <a:t>weight</a:t>
+            </a:r>
+            <a:r>
+              <a:rPr lang="sv-SE" sz="2000" dirty="0"/>
+              <a:t> </a:t>
+            </a:r>
+            <a:r>
+              <a:rPr lang="sv-SE" sz="2000" dirty="0" err="1"/>
+              <a:t>than</a:t>
+            </a:r>
+            <a:r>
+              <a:rPr lang="sv-SE" sz="2000" dirty="0"/>
+              <a:t> </a:t>
+            </a:r>
+            <a:r>
+              <a:rPr lang="sv-SE" sz="2000" dirty="0" err="1"/>
+              <a:t>other</a:t>
+            </a:r>
+            <a:r>
+              <a:rPr lang="sv-SE" sz="2000" dirty="0"/>
+              <a:t> data </a:t>
+            </a:r>
+            <a:r>
+              <a:rPr lang="sv-SE" sz="2000" dirty="0" err="1"/>
+              <a:t>points</a:t>
+            </a:r>
+            <a:r>
+              <a:rPr lang="sv-SE" sz="2000" dirty="0"/>
+              <a:t>. </a:t>
+            </a:r>
+            <a:r>
+              <a:rPr lang="sv-SE" sz="2000" dirty="0" err="1"/>
+              <a:t>Other</a:t>
+            </a:r>
+            <a:r>
+              <a:rPr lang="sv-SE" sz="2000" dirty="0"/>
+              <a:t> </a:t>
+            </a:r>
+            <a:r>
+              <a:rPr lang="sv-SE" sz="2000" dirty="0" err="1"/>
+              <a:t>basic</a:t>
+            </a:r>
+            <a:r>
+              <a:rPr lang="sv-SE" sz="2000" dirty="0"/>
+              <a:t> </a:t>
+            </a:r>
+            <a:r>
+              <a:rPr lang="sv-SE" sz="2000" dirty="0" err="1"/>
+              <a:t>algorithms</a:t>
+            </a:r>
+            <a:r>
+              <a:rPr lang="sv-SE" sz="2000" dirty="0"/>
+              <a:t> </a:t>
+            </a:r>
+            <a:r>
+              <a:rPr lang="sv-SE" sz="2000" dirty="0" err="1"/>
+              <a:t>will</a:t>
+            </a:r>
+            <a:r>
+              <a:rPr lang="sv-SE" sz="2000" dirty="0"/>
+              <a:t> not be as sensitive.</a:t>
+            </a:r>
+            <a:endParaRPr lang="sv-SE" sz="2000" b="1" dirty="0"/>
+          </a:p>
+          <a:p>
+            <a:pPr marL="0" indent="0">
+              <a:buNone/>
+            </a:pPr>
+            <a:r>
+              <a:rPr lang="sv-SE" sz="2000" b="1" dirty="0"/>
+              <a:t>Irrelevant inputs: </a:t>
+            </a:r>
+            <a:r>
+              <a:rPr lang="sv-SE" sz="2000" dirty="0"/>
+              <a:t>Decision </a:t>
+            </a:r>
+            <a:r>
+              <a:rPr lang="sv-SE" sz="2000" dirty="0" err="1"/>
+              <a:t>tree</a:t>
+            </a:r>
+            <a:r>
+              <a:rPr lang="sv-SE" sz="2000" dirty="0"/>
+              <a:t> and Naive </a:t>
+            </a:r>
+            <a:r>
+              <a:rPr lang="sv-SE" sz="2000" dirty="0" err="1"/>
+              <a:t>Bayes</a:t>
+            </a:r>
+            <a:r>
+              <a:rPr lang="sv-SE" sz="2000" dirty="0"/>
+              <a:t> </a:t>
+            </a:r>
+            <a:r>
+              <a:rPr lang="sv-SE" sz="2000" dirty="0" err="1"/>
+              <a:t>are</a:t>
+            </a:r>
+            <a:r>
+              <a:rPr lang="sv-SE" sz="2000" dirty="0"/>
+              <a:t> not sensitive to irrelevant input. Decision </a:t>
+            </a:r>
+            <a:r>
+              <a:rPr lang="sv-SE" sz="2000" dirty="0" err="1"/>
+              <a:t>trees</a:t>
+            </a:r>
+            <a:r>
+              <a:rPr lang="sv-SE" sz="2000" dirty="0"/>
+              <a:t> </a:t>
+            </a:r>
+            <a:r>
+              <a:rPr lang="sv-SE" sz="2000" dirty="0" err="1"/>
+              <a:t>wont</a:t>
+            </a:r>
+            <a:r>
+              <a:rPr lang="sv-SE" sz="2000" dirty="0"/>
+              <a:t> look at </a:t>
+            </a:r>
+            <a:r>
+              <a:rPr lang="sv-SE" sz="2000" dirty="0" err="1"/>
+              <a:t>these</a:t>
+            </a:r>
+            <a:r>
+              <a:rPr lang="sv-SE" sz="2000" dirty="0"/>
+              <a:t> </a:t>
+            </a:r>
+            <a:r>
+              <a:rPr lang="sv-SE" sz="2000" dirty="0" err="1"/>
+              <a:t>since</a:t>
+            </a:r>
+            <a:r>
+              <a:rPr lang="sv-SE" sz="2000" dirty="0"/>
+              <a:t> </a:t>
+            </a:r>
+            <a:r>
+              <a:rPr lang="sv-SE" sz="2000" dirty="0" err="1"/>
+              <a:t>they</a:t>
+            </a:r>
+            <a:r>
+              <a:rPr lang="sv-SE" sz="2000" dirty="0"/>
+              <a:t> </a:t>
+            </a:r>
+            <a:r>
+              <a:rPr lang="sv-SE" sz="2000" dirty="0" err="1"/>
+              <a:t>will</a:t>
+            </a:r>
+            <a:r>
+              <a:rPr lang="sv-SE" sz="2000" dirty="0"/>
+              <a:t> </a:t>
+            </a:r>
+            <a:r>
+              <a:rPr lang="sv-SE" sz="2000" dirty="0" err="1"/>
+              <a:t>have</a:t>
+            </a:r>
+            <a:r>
+              <a:rPr lang="sv-SE" sz="2000" dirty="0"/>
+              <a:t> </a:t>
+            </a:r>
+            <a:r>
+              <a:rPr lang="sv-SE" sz="2000" dirty="0" err="1"/>
+              <a:t>low</a:t>
+            </a:r>
+            <a:r>
+              <a:rPr lang="sv-SE" sz="2000" dirty="0"/>
+              <a:t> </a:t>
+            </a:r>
+            <a:r>
+              <a:rPr lang="sv-SE" sz="2000" dirty="0" err="1"/>
+              <a:t>entropy</a:t>
+            </a:r>
+            <a:r>
+              <a:rPr lang="sv-SE" sz="2000" dirty="0"/>
+              <a:t>. Boosting </a:t>
+            </a:r>
+            <a:r>
+              <a:rPr lang="sv-SE" sz="2000" dirty="0" err="1"/>
+              <a:t>should</a:t>
+            </a:r>
+            <a:r>
+              <a:rPr lang="sv-SE" sz="2000" dirty="0"/>
+              <a:t> not </a:t>
+            </a:r>
+            <a:r>
+              <a:rPr lang="sv-SE" sz="2000" dirty="0" err="1"/>
+              <a:t>affect</a:t>
+            </a:r>
+            <a:r>
+              <a:rPr lang="sv-SE" sz="2000" dirty="0"/>
+              <a:t> </a:t>
+            </a:r>
+            <a:r>
+              <a:rPr lang="sv-SE" sz="2000" dirty="0" err="1"/>
+              <a:t>these</a:t>
+            </a:r>
+            <a:r>
+              <a:rPr lang="sv-SE" sz="2000" dirty="0"/>
+              <a:t> </a:t>
+            </a:r>
+            <a:r>
+              <a:rPr lang="sv-SE" sz="2000" dirty="0" err="1"/>
+              <a:t>characteristics</a:t>
+            </a:r>
+            <a:r>
+              <a:rPr lang="sv-SE" sz="2000" dirty="0"/>
+              <a:t>. </a:t>
+            </a:r>
+            <a:endParaRPr lang="sv-SE" sz="2000" b="1" dirty="0"/>
+          </a:p>
+          <a:p>
+            <a:pPr marL="0" indent="0">
+              <a:buNone/>
+            </a:pPr>
+            <a:r>
+              <a:rPr lang="sv-SE" sz="2000" b="1" dirty="0" err="1"/>
+              <a:t>Predictive</a:t>
+            </a:r>
+            <a:r>
+              <a:rPr lang="sv-SE" sz="2000" b="1" dirty="0"/>
+              <a:t> </a:t>
+            </a:r>
+            <a:r>
+              <a:rPr lang="sv-SE" sz="2000" b="1" dirty="0" err="1"/>
+              <a:t>power</a:t>
+            </a:r>
+            <a:r>
+              <a:rPr lang="sv-SE" sz="2000" b="1" dirty="0"/>
+              <a:t>: </a:t>
+            </a:r>
+            <a:r>
+              <a:rPr lang="sv-SE" sz="2000" dirty="0" err="1"/>
+              <a:t>Naïve</a:t>
+            </a:r>
+            <a:r>
+              <a:rPr lang="sv-SE" sz="2000" dirty="0"/>
+              <a:t> </a:t>
+            </a:r>
+            <a:r>
+              <a:rPr lang="sv-SE" sz="2000" dirty="0" err="1"/>
+              <a:t>Bayes</a:t>
+            </a:r>
+            <a:r>
+              <a:rPr lang="sv-SE" sz="2000" dirty="0"/>
+              <a:t> </a:t>
+            </a:r>
+            <a:r>
+              <a:rPr lang="sv-SE" sz="2000" dirty="0" err="1"/>
+              <a:t>with</a:t>
+            </a:r>
+            <a:r>
+              <a:rPr lang="sv-SE" sz="2000" dirty="0"/>
+              <a:t> </a:t>
+            </a:r>
+            <a:r>
+              <a:rPr lang="sv-SE" sz="2000" dirty="0" err="1"/>
+              <a:t>little</a:t>
+            </a:r>
+            <a:r>
+              <a:rPr lang="sv-SE" sz="2000" dirty="0"/>
+              <a:t> </a:t>
+            </a:r>
+            <a:r>
+              <a:rPr lang="sv-SE" sz="2000" dirty="0" err="1"/>
+              <a:t>training</a:t>
+            </a:r>
+            <a:r>
+              <a:rPr lang="sv-SE" sz="2000" dirty="0"/>
+              <a:t> data. Decision </a:t>
+            </a:r>
+            <a:r>
+              <a:rPr lang="sv-SE" sz="2000" dirty="0" err="1"/>
+              <a:t>trees</a:t>
+            </a:r>
+            <a:r>
+              <a:rPr lang="sv-SE" sz="2000" dirty="0"/>
+              <a:t> </a:t>
+            </a:r>
+            <a:r>
+              <a:rPr lang="sv-SE" sz="2000" dirty="0" err="1"/>
+              <a:t>will</a:t>
+            </a:r>
+            <a:r>
+              <a:rPr lang="sv-SE" sz="2000" dirty="0"/>
+              <a:t> </a:t>
+            </a:r>
+            <a:r>
+              <a:rPr lang="sv-SE" sz="2000" dirty="0" err="1"/>
+              <a:t>often</a:t>
+            </a:r>
+            <a:r>
+              <a:rPr lang="sv-SE" sz="2000" dirty="0"/>
+              <a:t> </a:t>
+            </a:r>
+            <a:r>
+              <a:rPr lang="sv-SE" sz="2000" dirty="0" err="1"/>
+              <a:t>prune</a:t>
+            </a:r>
+            <a:r>
+              <a:rPr lang="sv-SE" sz="2000" dirty="0"/>
+              <a:t> </a:t>
+            </a:r>
+            <a:r>
+              <a:rPr lang="sv-SE" sz="2000" dirty="0" err="1"/>
+              <a:t>out</a:t>
+            </a:r>
+            <a:r>
+              <a:rPr lang="sv-SE" sz="2000" dirty="0"/>
+              <a:t> </a:t>
+            </a:r>
+            <a:r>
+              <a:rPr lang="sv-SE" sz="2000" dirty="0" err="1"/>
+              <a:t>unlikely</a:t>
+            </a:r>
+            <a:r>
+              <a:rPr lang="sv-SE" sz="2000" dirty="0"/>
+              <a:t> events, </a:t>
+            </a:r>
+            <a:r>
+              <a:rPr lang="sv-SE" sz="2000" dirty="0" err="1"/>
+              <a:t>meaning</a:t>
+            </a:r>
+            <a:r>
+              <a:rPr lang="sv-SE" sz="2000" dirty="0"/>
+              <a:t> </a:t>
+            </a:r>
+            <a:r>
+              <a:rPr lang="sv-SE" sz="2000" dirty="0" err="1"/>
+              <a:t>that</a:t>
+            </a:r>
+            <a:r>
+              <a:rPr lang="sv-SE" sz="2000" dirty="0"/>
+              <a:t> </a:t>
+            </a:r>
+            <a:r>
+              <a:rPr lang="sv-SE" sz="2000" dirty="0" err="1"/>
+              <a:t>they</a:t>
+            </a:r>
+            <a:r>
+              <a:rPr lang="sv-SE" sz="2000" dirty="0"/>
+              <a:t> </a:t>
+            </a:r>
+            <a:r>
+              <a:rPr lang="sv-SE" sz="2000" dirty="0" err="1"/>
+              <a:t>need</a:t>
+            </a:r>
+            <a:r>
+              <a:rPr lang="sv-SE" sz="2000" dirty="0"/>
+              <a:t> a </a:t>
+            </a:r>
+            <a:r>
+              <a:rPr lang="sv-SE" sz="2000" dirty="0" err="1"/>
+              <a:t>lot</a:t>
+            </a:r>
+            <a:r>
+              <a:rPr lang="sv-SE" sz="2000" dirty="0"/>
+              <a:t> </a:t>
+            </a:r>
+            <a:r>
+              <a:rPr lang="sv-SE" sz="2000" dirty="0" err="1"/>
+              <a:t>of</a:t>
+            </a:r>
+            <a:r>
+              <a:rPr lang="sv-SE" sz="2000" dirty="0"/>
+              <a:t> data to </a:t>
+            </a:r>
+            <a:r>
+              <a:rPr lang="sv-SE" sz="2000" dirty="0" err="1"/>
+              <a:t>have</a:t>
+            </a:r>
+            <a:r>
+              <a:rPr lang="sv-SE" sz="2000" dirty="0"/>
+              <a:t> </a:t>
+            </a:r>
+            <a:r>
+              <a:rPr lang="sv-SE" sz="2000" dirty="0" err="1"/>
+              <a:t>high</a:t>
+            </a:r>
+            <a:r>
+              <a:rPr lang="sv-SE" sz="2000" dirty="0"/>
+              <a:t> </a:t>
+            </a:r>
+            <a:r>
+              <a:rPr lang="sv-SE" sz="2000" dirty="0" err="1"/>
+              <a:t>predictive</a:t>
+            </a:r>
+            <a:r>
+              <a:rPr lang="sv-SE" sz="2000" dirty="0"/>
+              <a:t> </a:t>
+            </a:r>
+            <a:r>
+              <a:rPr lang="sv-SE" sz="2000" dirty="0" err="1"/>
+              <a:t>power</a:t>
+            </a:r>
+            <a:r>
+              <a:rPr lang="sv-SE" sz="2000" dirty="0"/>
+              <a:t>.</a:t>
+            </a:r>
+            <a:endParaRPr lang="sv-SE" sz="2000" b="1" dirty="0"/>
+          </a:p>
+          <a:p>
+            <a:pPr marL="0" indent="0">
+              <a:buNone/>
+            </a:pPr>
+            <a:r>
+              <a:rPr lang="sv-SE" sz="2000" b="1" dirty="0"/>
+              <a:t>Mixed </a:t>
+            </a:r>
+            <a:r>
+              <a:rPr lang="sv-SE" sz="2000" b="1" dirty="0" err="1"/>
+              <a:t>types</a:t>
+            </a:r>
+            <a:r>
+              <a:rPr lang="sv-SE" sz="2000" b="1" dirty="0"/>
+              <a:t> </a:t>
+            </a:r>
+            <a:r>
+              <a:rPr lang="sv-SE" sz="2000" b="1" dirty="0" err="1"/>
+              <a:t>of</a:t>
+            </a:r>
+            <a:r>
+              <a:rPr lang="sv-SE" sz="2000" b="1" dirty="0"/>
+              <a:t> data: </a:t>
+            </a:r>
+            <a:r>
+              <a:rPr lang="sv-SE" sz="2000" dirty="0"/>
+              <a:t>Decision </a:t>
+            </a:r>
+            <a:r>
+              <a:rPr lang="sv-SE" sz="2000" dirty="0" err="1"/>
+              <a:t>trees</a:t>
+            </a:r>
+            <a:r>
+              <a:rPr lang="sv-SE" sz="2000" dirty="0"/>
+              <a:t> </a:t>
+            </a:r>
+            <a:r>
+              <a:rPr lang="sv-SE" sz="2000" dirty="0" err="1"/>
+              <a:t>handles</a:t>
+            </a:r>
+            <a:r>
+              <a:rPr lang="sv-SE" sz="2000" dirty="0"/>
+              <a:t> mixed </a:t>
+            </a:r>
+            <a:r>
+              <a:rPr lang="sv-SE" sz="2000" dirty="0" err="1"/>
+              <a:t>types</a:t>
+            </a:r>
+            <a:r>
+              <a:rPr lang="sv-SE" sz="2000" dirty="0"/>
+              <a:t> </a:t>
+            </a:r>
+            <a:r>
+              <a:rPr lang="sv-SE" sz="2000" dirty="0" err="1"/>
+              <a:t>of</a:t>
+            </a:r>
+            <a:r>
+              <a:rPr lang="sv-SE" sz="2000" dirty="0"/>
+              <a:t> data </a:t>
+            </a:r>
+            <a:r>
+              <a:rPr lang="sv-SE" sz="2000" dirty="0" err="1"/>
+              <a:t>well</a:t>
+            </a:r>
+            <a:r>
+              <a:rPr lang="sv-SE" sz="2000" dirty="0"/>
+              <a:t>, </a:t>
+            </a:r>
+            <a:r>
+              <a:rPr lang="sv-SE" sz="2000" dirty="0" err="1"/>
+              <a:t>since</a:t>
+            </a:r>
+            <a:r>
+              <a:rPr lang="sv-SE" sz="2000" dirty="0"/>
+              <a:t> </a:t>
+            </a:r>
+            <a:r>
+              <a:rPr lang="sv-SE" sz="2000" dirty="0" err="1"/>
+              <a:t>they</a:t>
+            </a:r>
+            <a:r>
+              <a:rPr lang="sv-SE" sz="2000" dirty="0"/>
+              <a:t> </a:t>
+            </a:r>
+            <a:r>
+              <a:rPr lang="sv-SE" sz="2000" dirty="0" err="1"/>
+              <a:t>branch</a:t>
+            </a:r>
+            <a:r>
+              <a:rPr lang="sv-SE" sz="2000" dirty="0"/>
+              <a:t> on </a:t>
+            </a:r>
+            <a:r>
+              <a:rPr lang="sv-SE" sz="2000" dirty="0" err="1"/>
+              <a:t>discriminative</a:t>
+            </a:r>
+            <a:r>
+              <a:rPr lang="sv-SE" sz="2000" dirty="0"/>
+              <a:t> features. </a:t>
+            </a:r>
+            <a:r>
+              <a:rPr lang="sv-SE" sz="2000" dirty="0" err="1"/>
+              <a:t>Adaboost</a:t>
+            </a:r>
+            <a:r>
+              <a:rPr lang="sv-SE" sz="2000" dirty="0"/>
+              <a:t> and </a:t>
+            </a:r>
+            <a:r>
+              <a:rPr lang="sv-SE" sz="2000" dirty="0" err="1"/>
+              <a:t>random</a:t>
+            </a:r>
+            <a:r>
+              <a:rPr lang="sv-SE" sz="2000" dirty="0"/>
+              <a:t> </a:t>
+            </a:r>
+            <a:r>
+              <a:rPr lang="sv-SE" sz="2000" dirty="0" err="1"/>
+              <a:t>forest</a:t>
+            </a:r>
+            <a:r>
+              <a:rPr lang="sv-SE" sz="2000" dirty="0"/>
+              <a:t> do </a:t>
+            </a:r>
+            <a:r>
+              <a:rPr lang="sv-SE" sz="2000" dirty="0" err="1"/>
+              <a:t>well</a:t>
+            </a:r>
+            <a:r>
+              <a:rPr lang="sv-SE" sz="2000" dirty="0"/>
+              <a:t> </a:t>
+            </a:r>
+            <a:r>
+              <a:rPr lang="sv-SE" sz="2000" dirty="0" err="1"/>
+              <a:t>too</a:t>
+            </a:r>
+            <a:r>
+              <a:rPr lang="sv-SE" sz="2000" dirty="0"/>
+              <a:t>.</a:t>
+            </a:r>
+          </a:p>
+          <a:p>
+            <a:pPr marL="0" lvl="0" indent="0">
+              <a:spcBef>
+                <a:spcPts val="0"/>
+              </a:spcBef>
+              <a:buNone/>
+            </a:pPr>
+            <a:r>
+              <a:rPr lang="sv-SE" sz="2000" dirty="0" err="1"/>
+              <a:t>Choose</a:t>
+            </a:r>
+            <a:r>
+              <a:rPr lang="sv-SE" sz="2000" dirty="0"/>
+              <a:t> </a:t>
+            </a:r>
+            <a:r>
+              <a:rPr lang="sv-SE" sz="2000" dirty="0" err="1"/>
+              <a:t>Multinomial</a:t>
+            </a:r>
+            <a:r>
+              <a:rPr lang="sv-SE" sz="2000" dirty="0"/>
+              <a:t> Naive </a:t>
+            </a:r>
+            <a:r>
+              <a:rPr lang="sv-SE" sz="2000" dirty="0" err="1"/>
+              <a:t>Bayes</a:t>
+            </a:r>
+            <a:r>
+              <a:rPr lang="sv-SE" sz="2000" dirty="0"/>
+              <a:t> for </a:t>
+            </a:r>
+            <a:r>
+              <a:rPr lang="sv-SE" sz="2000" dirty="0" err="1"/>
+              <a:t>binary</a:t>
+            </a:r>
+            <a:r>
+              <a:rPr lang="sv-SE" sz="2000" dirty="0"/>
+              <a:t> or </a:t>
+            </a:r>
+            <a:r>
+              <a:rPr lang="sv-SE" sz="2000" dirty="0" err="1"/>
+              <a:t>categorical</a:t>
+            </a:r>
+            <a:r>
+              <a:rPr lang="sv-SE" sz="2000" dirty="0"/>
+              <a:t> data and </a:t>
+            </a:r>
+            <a:r>
+              <a:rPr lang="sv-SE" sz="2000" dirty="0" err="1"/>
+              <a:t>Gaussian</a:t>
+            </a:r>
+            <a:r>
+              <a:rPr lang="sv-SE" sz="2000" dirty="0"/>
+              <a:t> Naive </a:t>
+            </a:r>
+            <a:r>
+              <a:rPr lang="sv-SE" sz="2000" dirty="0" err="1"/>
+              <a:t>Bayes</a:t>
+            </a:r>
+            <a:r>
+              <a:rPr lang="sv-SE" sz="2000" dirty="0"/>
+              <a:t> for </a:t>
+            </a:r>
+            <a:r>
+              <a:rPr lang="sv-SE" sz="2000" dirty="0" err="1"/>
+              <a:t>continuous</a:t>
+            </a:r>
+            <a:r>
+              <a:rPr lang="sv-SE" sz="2000" dirty="0"/>
+              <a:t> data. </a:t>
+            </a:r>
+            <a:r>
+              <a:rPr lang="sv-SE" sz="2000" dirty="0" err="1"/>
+              <a:t>Some</a:t>
+            </a:r>
+            <a:r>
+              <a:rPr lang="sv-SE" sz="2000" dirty="0"/>
+              <a:t> transformations from </a:t>
+            </a:r>
+            <a:r>
+              <a:rPr lang="sv-SE" sz="2000" dirty="0" err="1"/>
+              <a:t>continuous</a:t>
+            </a:r>
+            <a:r>
+              <a:rPr lang="sv-SE" sz="2000" dirty="0"/>
+              <a:t> data to </a:t>
+            </a:r>
+            <a:r>
+              <a:rPr lang="sv-SE" sz="2000" dirty="0" err="1"/>
+              <a:t>categorical</a:t>
+            </a:r>
+            <a:r>
+              <a:rPr lang="sv-SE" sz="2000" dirty="0"/>
+              <a:t> data </a:t>
+            </a:r>
+            <a:r>
+              <a:rPr lang="sv-SE" sz="2000" dirty="0" err="1"/>
+              <a:t>could</a:t>
+            </a:r>
+            <a:r>
+              <a:rPr lang="sv-SE" sz="2000" dirty="0"/>
+              <a:t> be </a:t>
+            </a:r>
+            <a:r>
+              <a:rPr lang="sv-SE" sz="2000" dirty="0" err="1"/>
+              <a:t>necessary</a:t>
+            </a:r>
+            <a:r>
+              <a:rPr lang="sv-SE" sz="2000" dirty="0"/>
+              <a:t>.</a:t>
+            </a:r>
+            <a:endParaRPr lang="sv-SE" sz="2000" b="1" dirty="0"/>
+          </a:p>
+          <a:p>
+            <a:pPr marL="0" indent="0">
+              <a:buNone/>
+            </a:pPr>
+            <a:r>
+              <a:rPr lang="sv-SE" sz="2000" b="1" dirty="0" err="1"/>
+              <a:t>Scalability</a:t>
+            </a:r>
+            <a:r>
+              <a:rPr lang="sv-SE" sz="2000" b="1" dirty="0"/>
+              <a:t>: </a:t>
+            </a:r>
+            <a:r>
+              <a:rPr lang="sv-SE" sz="2000" dirty="0" err="1"/>
+              <a:t>Na</a:t>
+            </a:r>
+            <a:r>
+              <a:rPr lang="sv-SE" sz="2000" dirty="0" err="1">
+                <a:solidFill>
+                  <a:schemeClr val="dk1"/>
+                </a:solidFill>
+              </a:rPr>
+              <a:t>ï</a:t>
+            </a:r>
+            <a:r>
+              <a:rPr lang="sv-SE" sz="2000" dirty="0" err="1"/>
+              <a:t>ve</a:t>
+            </a:r>
+            <a:r>
+              <a:rPr lang="sv-SE" sz="2000" dirty="0"/>
+              <a:t> </a:t>
+            </a:r>
+            <a:r>
+              <a:rPr lang="sv-SE" sz="2000" dirty="0" err="1"/>
+              <a:t>Bayes</a:t>
+            </a:r>
+            <a:r>
+              <a:rPr lang="sv-SE" sz="2000" dirty="0"/>
+              <a:t> </a:t>
+            </a:r>
+            <a:r>
+              <a:rPr lang="sv-SE" sz="2000" dirty="0" err="1"/>
+              <a:t>algorithm</a:t>
+            </a:r>
+            <a:r>
+              <a:rPr lang="sv-SE" sz="2000" dirty="0"/>
+              <a:t> </a:t>
+            </a:r>
+            <a:r>
+              <a:rPr lang="sv-SE" sz="2000" dirty="0" err="1"/>
+              <a:t>only</a:t>
+            </a:r>
+            <a:r>
+              <a:rPr lang="sv-SE" sz="2000" dirty="0"/>
+              <a:t> </a:t>
+            </a:r>
+            <a:r>
+              <a:rPr lang="sv-SE" sz="2000" dirty="0" err="1"/>
+              <a:t>requires</a:t>
+            </a:r>
+            <a:r>
+              <a:rPr lang="sv-SE" sz="2000" dirty="0"/>
+              <a:t> </a:t>
+            </a:r>
+            <a:r>
+              <a:rPr lang="sv-SE" sz="2000" dirty="0" err="1"/>
+              <a:t>one</a:t>
+            </a:r>
+            <a:r>
+              <a:rPr lang="sv-SE" sz="2000" dirty="0"/>
+              <a:t> pass on the </a:t>
+            </a:r>
+            <a:r>
+              <a:rPr lang="sv-SE" sz="2000" dirty="0" err="1"/>
+              <a:t>entire</a:t>
+            </a:r>
+            <a:r>
+              <a:rPr lang="sv-SE" sz="2000" dirty="0"/>
+              <a:t> </a:t>
+            </a:r>
+            <a:r>
+              <a:rPr lang="sv-SE" sz="2000" dirty="0" err="1"/>
+              <a:t>dataset</a:t>
+            </a:r>
+            <a:r>
+              <a:rPr lang="sv-SE" sz="2000" dirty="0"/>
+              <a:t> to </a:t>
+            </a:r>
+            <a:r>
+              <a:rPr lang="sv-SE" sz="2000" dirty="0" err="1"/>
+              <a:t>calculate</a:t>
+            </a:r>
+            <a:r>
+              <a:rPr lang="sv-SE" sz="2000" dirty="0"/>
+              <a:t> the </a:t>
+            </a:r>
+            <a:r>
+              <a:rPr lang="sv-SE" sz="2000" dirty="0" err="1"/>
+              <a:t>posterior</a:t>
+            </a:r>
+            <a:r>
+              <a:rPr lang="sv-SE" sz="2000" dirty="0"/>
+              <a:t> </a:t>
+            </a:r>
+            <a:r>
+              <a:rPr lang="sv-SE" sz="2000" dirty="0" err="1"/>
+              <a:t>probabilities</a:t>
+            </a:r>
+            <a:r>
+              <a:rPr lang="sv-SE" sz="2000" dirty="0"/>
+              <a:t> for </a:t>
+            </a:r>
+            <a:r>
+              <a:rPr lang="sv-SE" sz="2000" dirty="0" err="1"/>
+              <a:t>each</a:t>
+            </a:r>
+            <a:r>
+              <a:rPr lang="sv-SE" sz="2000" dirty="0"/>
+              <a:t> </a:t>
+            </a:r>
+            <a:r>
+              <a:rPr lang="sv-SE" sz="2000" dirty="0" err="1"/>
+              <a:t>value</a:t>
+            </a:r>
+            <a:r>
+              <a:rPr lang="sv-SE" sz="2000" dirty="0"/>
+              <a:t> </a:t>
+            </a:r>
+            <a:r>
+              <a:rPr lang="sv-SE" sz="2000" dirty="0" err="1"/>
+              <a:t>of</a:t>
+            </a:r>
+            <a:r>
+              <a:rPr lang="sv-SE" sz="2000" dirty="0"/>
+              <a:t> the feature in the </a:t>
+            </a:r>
+            <a:r>
+              <a:rPr lang="sv-SE" sz="2000" dirty="0" err="1"/>
+              <a:t>dataset</a:t>
+            </a:r>
+            <a:r>
+              <a:rPr lang="sv-SE" sz="2000" dirty="0"/>
+              <a:t>. So, </a:t>
+            </a:r>
+            <a:r>
+              <a:rPr lang="sv-SE" sz="2000" dirty="0" err="1"/>
+              <a:t>when</a:t>
+            </a:r>
+            <a:r>
+              <a:rPr lang="sv-SE" sz="2000" dirty="0"/>
+              <a:t> </a:t>
+            </a:r>
+            <a:r>
+              <a:rPr lang="sv-SE" sz="2000" dirty="0" err="1"/>
+              <a:t>we</a:t>
+            </a:r>
+            <a:r>
+              <a:rPr lang="sv-SE" sz="2000" dirty="0"/>
+              <a:t> </a:t>
+            </a:r>
+            <a:r>
+              <a:rPr lang="sv-SE" sz="2000" dirty="0" err="1"/>
+              <a:t>are</a:t>
+            </a:r>
+            <a:r>
+              <a:rPr lang="sv-SE" sz="2000" dirty="0"/>
+              <a:t> </a:t>
+            </a:r>
+            <a:r>
+              <a:rPr lang="sv-SE" sz="2000" dirty="0" err="1"/>
+              <a:t>dealing</a:t>
+            </a:r>
+            <a:r>
+              <a:rPr lang="sv-SE" sz="2000" dirty="0"/>
+              <a:t> </a:t>
+            </a:r>
+            <a:r>
+              <a:rPr lang="sv-SE" sz="2000" dirty="0" err="1"/>
+              <a:t>with</a:t>
+            </a:r>
+            <a:r>
+              <a:rPr lang="sv-SE" sz="2000" dirty="0"/>
+              <a:t> </a:t>
+            </a:r>
+            <a:r>
+              <a:rPr lang="sv-SE" sz="2000" dirty="0" err="1"/>
+              <a:t>large</a:t>
+            </a:r>
+            <a:r>
+              <a:rPr lang="sv-SE" sz="2000" dirty="0"/>
+              <a:t> </a:t>
+            </a:r>
+            <a:r>
+              <a:rPr lang="sv-SE" sz="2000" dirty="0" err="1"/>
+              <a:t>datasets</a:t>
+            </a:r>
+            <a:r>
+              <a:rPr lang="sv-SE" sz="2000" dirty="0"/>
+              <a:t> or </a:t>
+            </a:r>
+            <a:r>
+              <a:rPr lang="sv-SE" sz="2000" dirty="0" err="1"/>
+              <a:t>low</a:t>
+            </a:r>
+            <a:r>
+              <a:rPr lang="sv-SE" sz="2000" dirty="0"/>
+              <a:t>-budget hardware, Naive </a:t>
+            </a:r>
+            <a:r>
+              <a:rPr lang="sv-SE" sz="2000" dirty="0" err="1"/>
+              <a:t>Bayes</a:t>
+            </a:r>
+            <a:r>
+              <a:rPr lang="sv-SE" sz="2000" dirty="0"/>
+              <a:t> </a:t>
+            </a:r>
+            <a:r>
+              <a:rPr lang="sv-SE" sz="2000" dirty="0" err="1"/>
+              <a:t>algorithm</a:t>
+            </a:r>
+            <a:r>
+              <a:rPr lang="sv-SE" sz="2000" dirty="0"/>
+              <a:t> is a </a:t>
+            </a:r>
+            <a:r>
+              <a:rPr lang="sv-SE" sz="2000" dirty="0" err="1"/>
+              <a:t>feasible</a:t>
+            </a:r>
+            <a:r>
+              <a:rPr lang="sv-SE" sz="2000" dirty="0"/>
+              <a:t> choice.</a:t>
+            </a:r>
+          </a:p>
+          <a:p>
+            <a:pPr marL="0" indent="0">
+              <a:buNone/>
+            </a:pPr>
+            <a:endParaRPr lang="sv-SE" sz="2000" b="1" dirty="0"/>
+          </a:p>
+        </p:txBody>
+      </p:sp>
+    </p:spTree>
+    <p:extLst>
+      <p:ext uri="{BB962C8B-B14F-4D97-AF65-F5344CB8AC3E}">
+        <p14:creationId xmlns:p14="http://schemas.microsoft.com/office/powerpoint/2010/main" val="1044989100"/>
+      </p:ext>
+    </p:extLst>
+  </p:cSld>
+  <p:clrMapOvr>
+    <a:masterClrMapping/>
+  </p:clrMapOvr>
+</p:sld>
+</file>
+
+<file path=ppt/slides/slide15.xml><?xml version="1.0" encoding="utf-8"?>
+<p:sld xmlns:a="http://schemas.openxmlformats.org/drawingml/2006/main" xmlns:r="http://schemas.openxmlformats.org/officeDocument/2006/relationships" xmlns:p="http://schemas.openxmlformats.org/presentationml/2006/main">
+  <p:cSld>
+    <p:spTree>
+      <p:nvGrpSpPr>
+        <p:cNvPr id="1" name=""/>
+        <p:cNvGrpSpPr/>
+        <p:nvPr/>
+      </p:nvGrpSpPr>
+      <p:grpSpPr>
+        <a:xfrm>
+          <a:off x="0" y="0"/>
+          <a:ext cx="0" cy="0"/>
+          <a:chOff x="0" y="0"/>
+          <a:chExt cx="0" cy="0"/>
+        </a:xfrm>
+      </p:grpSpPr>
+      <p:sp>
+        <p:nvSpPr>
+          <p:cNvPr id="2" name="Rubrik 1">
+            <a:extLst>
+              <a:ext uri="{FF2B5EF4-FFF2-40B4-BE49-F238E27FC236}">
+                <a16:creationId xmlns:a16="http://schemas.microsoft.com/office/drawing/2014/main" id="{3A98DBAB-24C9-7949-801D-1553E185F8FC}"/>
+              </a:ext>
+            </a:extLst>
+          </p:cNvPr>
+          <p:cNvSpPr>
+            <a:spLocks noGrp="1"/>
+          </p:cNvSpPr>
+          <p:nvPr>
+            <p:ph type="title"/>
+          </p:nvPr>
+        </p:nvSpPr>
+        <p:spPr/>
+        <p:txBody>
+          <a:bodyPr/>
+          <a:lstStyle/>
+          <a:p>
+            <a:endParaRPr lang="sv-SE"/>
+          </a:p>
+        </p:txBody>
+      </p:sp>
+      <p:sp>
+        <p:nvSpPr>
+          <p:cNvPr id="3" name="Platshållare för innehåll 2">
+            <a:extLst>
+              <a:ext uri="{FF2B5EF4-FFF2-40B4-BE49-F238E27FC236}">
+                <a16:creationId xmlns:a16="http://schemas.microsoft.com/office/drawing/2014/main" id="{986FC575-120D-C142-98C8-9DD7B2A7E2CF}"/>
+              </a:ext>
+            </a:extLst>
+          </p:cNvPr>
+          <p:cNvSpPr>
+            <a:spLocks noGrp="1"/>
+          </p:cNvSpPr>
+          <p:nvPr>
+            <p:ph idx="1"/>
+          </p:nvPr>
+        </p:nvSpPr>
+        <p:spPr/>
+        <p:txBody>
+          <a:bodyPr/>
+          <a:lstStyle/>
+          <a:p>
+            <a:endParaRPr lang="sv-SE"/>
+          </a:p>
+        </p:txBody>
+      </p:sp>
+    </p:spTree>
+    <p:extLst>
+      <p:ext uri="{BB962C8B-B14F-4D97-AF65-F5344CB8AC3E}">
+        <p14:creationId xmlns:p14="http://schemas.microsoft.com/office/powerpoint/2010/main" val="2970655109"/>
+      </p:ext>
+    </p:extLst>
+  </p:cSld>
+  <p:clrMapOvr>
+    <a:masterClrMapping/>
+  </p:clrMapOvr>
+</p:sld>
+</file>
+
+<file path=ppt/slides/slide2.xml><?xml version="1.0" encoding="utf-8"?>
+<p:sld xmlns:a="http://schemas.openxmlformats.org/drawingml/2006/main" xmlns:r="http://schemas.openxmlformats.org/officeDocument/2006/relationships" xmlns:p="http://schemas.openxmlformats.org/presentationml/2006/main">
+  <p:cSld>
+    <p:spTree>
+      <p:nvGrpSpPr>
+        <p:cNvPr id="1" name=""/>
+        <p:cNvGrpSpPr/>
+        <p:nvPr/>
+      </p:nvGrpSpPr>
+      <p:grpSpPr>
+        <a:xfrm>
+          <a:off x="0" y="0"/>
+          <a:ext cx="0" cy="0"/>
+          <a:chOff x="0" y="0"/>
+          <a:chExt cx="0" cy="0"/>
+        </a:xfrm>
+      </p:grpSpPr>
+      <p:sp>
+        <p:nvSpPr>
+          <p:cNvPr id="2" name="Rubrik 1">
+            <a:extLst>
+              <a:ext uri="{FF2B5EF4-FFF2-40B4-BE49-F238E27FC236}">
+                <a16:creationId xmlns:a16="http://schemas.microsoft.com/office/drawing/2014/main" id="{4031BDCD-4706-F94C-9C57-8F3D17CB2A70}"/>
+              </a:ext>
+            </a:extLst>
+          </p:cNvPr>
+          <p:cNvSpPr>
+            <a:spLocks noGrp="1"/>
+          </p:cNvSpPr>
+          <p:nvPr>
+            <p:ph type="title"/>
+          </p:nvPr>
+        </p:nvSpPr>
+        <p:spPr/>
+        <p:txBody>
+          <a:bodyPr/>
+          <a:lstStyle/>
+          <a:p>
+            <a:r>
+              <a:rPr lang="sv-SE" dirty="0" err="1"/>
+              <a:t>Assignment</a:t>
+            </a:r>
+            <a:r>
+              <a:rPr lang="sv-SE" dirty="0"/>
+              <a:t> 1: 95%-</a:t>
+            </a:r>
+            <a:r>
+              <a:rPr lang="sv-SE" dirty="0" err="1"/>
+              <a:t>confidence</a:t>
+            </a:r>
+            <a:r>
+              <a:rPr lang="sv-SE" dirty="0"/>
+              <a:t> </a:t>
+            </a:r>
+            <a:r>
+              <a:rPr lang="sv-SE" dirty="0" err="1"/>
+              <a:t>interval</a:t>
+            </a:r>
+            <a:r>
+              <a:rPr lang="sv-SE" dirty="0"/>
+              <a:t> </a:t>
+            </a:r>
+            <a:br>
+              <a:rPr lang="sv-SE" dirty="0"/>
+            </a:br>
+            <a:endParaRPr lang="sv-SE" dirty="0"/>
+          </a:p>
+        </p:txBody>
+      </p:sp>
+      <p:pic>
+        <p:nvPicPr>
+          <p:cNvPr id="4" name="Platshållare för innehåll 3">
+            <a:extLst>
+              <a:ext uri="{FF2B5EF4-FFF2-40B4-BE49-F238E27FC236}">
+                <a16:creationId xmlns:a16="http://schemas.microsoft.com/office/drawing/2014/main" id="{C37DE10B-12A1-F448-971F-0D9C66D2AF35}"/>
+              </a:ext>
+            </a:extLst>
+          </p:cNvPr>
+          <p:cNvPicPr>
+            <a:picLocks noGrp="1" noChangeAspect="1"/>
+          </p:cNvPicPr>
+          <p:nvPr>
+            <p:ph idx="1"/>
+          </p:nvPr>
+        </p:nvPicPr>
+        <p:blipFill>
+          <a:blip r:embed="rId2"/>
+          <a:stretch>
+            <a:fillRect/>
+          </a:stretch>
+        </p:blipFill>
+        <p:spPr>
+          <a:xfrm>
+            <a:off x="3248953" y="1825625"/>
+            <a:ext cx="5694094" cy="4351338"/>
+          </a:xfrm>
+          <a:prstGeom prst="rect">
+            <a:avLst/>
+          </a:prstGeom>
+        </p:spPr>
+      </p:pic>
+    </p:spTree>
+    <p:extLst>
+      <p:ext uri="{BB962C8B-B14F-4D97-AF65-F5344CB8AC3E}">
+        <p14:creationId xmlns:p14="http://schemas.microsoft.com/office/powerpoint/2010/main" val="413051891"/>
+      </p:ext>
+    </p:extLst>
+  </p:cSld>
+  <p:clrMapOvr>
+    <a:masterClrMapping/>
+  </p:clrMapOvr>
+</p:sld>
+</file>
+
+<file path=ppt/slides/slide3.xml><?xml version="1.0" encoding="utf-8"?>
+<p:sld xmlns:a="http://schemas.openxmlformats.org/drawingml/2006/main" xmlns:r="http://schemas.openxmlformats.org/officeDocument/2006/relationships" xmlns:p="http://schemas.openxmlformats.org/presentationml/2006/main">
+  <p:cSld>
+    <p:spTree>
+      <p:nvGrpSpPr>
+        <p:cNvPr id="1" name=""/>
+        <p:cNvGrpSpPr/>
+        <p:nvPr/>
+      </p:nvGrpSpPr>
+      <p:grpSpPr>
+        <a:xfrm>
+          <a:off x="0" y="0"/>
+          <a:ext cx="0" cy="0"/>
+          <a:chOff x="0" y="0"/>
+          <a:chExt cx="0" cy="0"/>
+        </a:xfrm>
+      </p:grpSpPr>
+      <p:sp>
+        <p:nvSpPr>
+          <p:cNvPr id="2" name="Rubrik 1">
+            <a:extLst>
+              <a:ext uri="{FF2B5EF4-FFF2-40B4-BE49-F238E27FC236}">
+                <a16:creationId xmlns:a16="http://schemas.microsoft.com/office/drawing/2014/main" id="{95AD1105-B374-4A47-B36E-4FCA793DDFB4}"/>
+              </a:ext>
+            </a:extLst>
+          </p:cNvPr>
+          <p:cNvSpPr>
+            <a:spLocks noGrp="1"/>
+          </p:cNvSpPr>
+          <p:nvPr>
+            <p:ph type="title"/>
+          </p:nvPr>
+        </p:nvSpPr>
+        <p:spPr/>
+        <p:txBody>
+          <a:bodyPr/>
+          <a:lstStyle/>
+          <a:p>
+            <a:r>
+              <a:rPr lang="sv-SE" dirty="0" err="1"/>
+              <a:t>Assignment</a:t>
+            </a:r>
+            <a:r>
+              <a:rPr lang="sv-SE" dirty="0"/>
+              <a:t> 3: Iris</a:t>
+            </a:r>
+          </a:p>
+        </p:txBody>
+      </p:sp>
+      <p:sp>
+        <p:nvSpPr>
+          <p:cNvPr id="6" name="Platshållare för innehåll 5">
+            <a:extLst>
+              <a:ext uri="{FF2B5EF4-FFF2-40B4-BE49-F238E27FC236}">
+                <a16:creationId xmlns:a16="http://schemas.microsoft.com/office/drawing/2014/main" id="{A61E44F6-CE80-4E46-A2AE-58ECB2FA527D}"/>
+              </a:ext>
+            </a:extLst>
+          </p:cNvPr>
+          <p:cNvSpPr>
+            <a:spLocks noGrp="1"/>
+          </p:cNvSpPr>
+          <p:nvPr>
+            <p:ph idx="1"/>
+          </p:nvPr>
+        </p:nvSpPr>
+        <p:spPr/>
+        <p:txBody>
+          <a:bodyPr/>
+          <a:lstStyle/>
+          <a:p>
+            <a:endParaRPr lang="sv-SE"/>
+          </a:p>
+        </p:txBody>
+      </p:sp>
+      <p:pic>
+        <p:nvPicPr>
+          <p:cNvPr id="7" name="Bildobjekt 6">
+            <a:extLst>
+              <a:ext uri="{FF2B5EF4-FFF2-40B4-BE49-F238E27FC236}">
+                <a16:creationId xmlns:a16="http://schemas.microsoft.com/office/drawing/2014/main" id="{CE27B6A9-0987-1242-AE7D-4CA2907D437A}"/>
+              </a:ext>
+            </a:extLst>
+          </p:cNvPr>
+          <p:cNvPicPr>
+            <a:picLocks noChangeAspect="1"/>
+          </p:cNvPicPr>
+          <p:nvPr/>
+        </p:nvPicPr>
+        <p:blipFill>
+          <a:blip r:embed="rId2"/>
+          <a:stretch>
+            <a:fillRect/>
+          </a:stretch>
+        </p:blipFill>
+        <p:spPr>
+          <a:xfrm>
+            <a:off x="1306632" y="2513012"/>
+            <a:ext cx="9368695" cy="3044826"/>
+          </a:xfrm>
+          <a:prstGeom prst="rect">
+            <a:avLst/>
+          </a:prstGeom>
+        </p:spPr>
+      </p:pic>
+    </p:spTree>
+    <p:extLst>
+      <p:ext uri="{BB962C8B-B14F-4D97-AF65-F5344CB8AC3E}">
+        <p14:creationId xmlns:p14="http://schemas.microsoft.com/office/powerpoint/2010/main" val="4256564682"/>
+      </p:ext>
+    </p:extLst>
+  </p:cSld>
+  <p:clrMapOvr>
+    <a:masterClrMapping/>
+  </p:clrMapOvr>
+</p:sld>
+</file>
+
+<file path=ppt/slides/slide4.xml><?xml version="1.0" encoding="utf-8"?>
+<p:sld xmlns:a="http://schemas.openxmlformats.org/drawingml/2006/main" xmlns:r="http://schemas.openxmlformats.org/officeDocument/2006/relationships" xmlns:p="http://schemas.openxmlformats.org/presentationml/2006/main">
+  <p:cSld>
+    <p:spTree>
+      <p:nvGrpSpPr>
+        <p:cNvPr id="1" name=""/>
+        <p:cNvGrpSpPr/>
+        <p:nvPr/>
+      </p:nvGrpSpPr>
+      <p:grpSpPr>
+        <a:xfrm>
+          <a:off x="0" y="0"/>
+          <a:ext cx="0" cy="0"/>
+          <a:chOff x="0" y="0"/>
+          <a:chExt cx="0" cy="0"/>
+        </a:xfrm>
+      </p:grpSpPr>
+      <p:sp>
+        <p:nvSpPr>
+          <p:cNvPr id="2" name="Rubrik 1">
+            <a:extLst>
+              <a:ext uri="{FF2B5EF4-FFF2-40B4-BE49-F238E27FC236}">
+                <a16:creationId xmlns:a16="http://schemas.microsoft.com/office/drawing/2014/main" id="{23B1BBFF-1171-F144-AE4E-28DC4726B4F0}"/>
+              </a:ext>
+            </a:extLst>
+          </p:cNvPr>
+          <p:cNvSpPr>
+            <a:spLocks noGrp="1"/>
+          </p:cNvSpPr>
+          <p:nvPr>
+            <p:ph type="title"/>
+          </p:nvPr>
+        </p:nvSpPr>
+        <p:spPr/>
+        <p:txBody>
+          <a:bodyPr/>
+          <a:lstStyle/>
+          <a:p>
+            <a:r>
+              <a:rPr lang="sv-SE" dirty="0" err="1"/>
+              <a:t>Assignment</a:t>
+            </a:r>
+            <a:r>
+              <a:rPr lang="sv-SE" dirty="0"/>
+              <a:t> 3: </a:t>
+            </a:r>
+            <a:r>
+              <a:rPr lang="sv-SE" dirty="0" err="1"/>
+              <a:t>Vowel</a:t>
+            </a:r>
+            <a:endParaRPr lang="sv-SE" dirty="0"/>
+          </a:p>
+        </p:txBody>
+      </p:sp>
+      <p:pic>
+        <p:nvPicPr>
+          <p:cNvPr id="4" name="Platshållare för innehåll 3">
+            <a:extLst>
+              <a:ext uri="{FF2B5EF4-FFF2-40B4-BE49-F238E27FC236}">
+                <a16:creationId xmlns:a16="http://schemas.microsoft.com/office/drawing/2014/main" id="{3B0BD3FE-F2D2-B748-B9ED-199120D44CBB}"/>
+              </a:ext>
+            </a:extLst>
+          </p:cNvPr>
+          <p:cNvPicPr>
+            <a:picLocks noGrp="1" noChangeAspect="1"/>
+          </p:cNvPicPr>
+          <p:nvPr>
+            <p:ph idx="1"/>
+          </p:nvPr>
+        </p:nvPicPr>
+        <p:blipFill>
+          <a:blip r:embed="rId2"/>
+          <a:stretch>
+            <a:fillRect/>
+          </a:stretch>
+        </p:blipFill>
+        <p:spPr>
+          <a:xfrm>
+            <a:off x="1299754" y="2516982"/>
+            <a:ext cx="9793696" cy="3098006"/>
+          </a:xfrm>
+          <a:prstGeom prst="rect">
+            <a:avLst/>
+          </a:prstGeom>
+        </p:spPr>
+      </p:pic>
+    </p:spTree>
+    <p:extLst>
+      <p:ext uri="{BB962C8B-B14F-4D97-AF65-F5344CB8AC3E}">
+        <p14:creationId xmlns:p14="http://schemas.microsoft.com/office/powerpoint/2010/main" val="938458956"/>
+      </p:ext>
+    </p:extLst>
+  </p:cSld>
+  <p:clrMapOvr>
+    <a:masterClrMapping/>
+  </p:clrMapOvr>
+</p:sld>
+</file>
+
+<file path=ppt/slides/slide5.xml><?xml version="1.0" encoding="utf-8"?>
+<p:sld xmlns:a="http://schemas.openxmlformats.org/drawingml/2006/main" xmlns:r="http://schemas.openxmlformats.org/officeDocument/2006/relationships" xmlns:p="http://schemas.openxmlformats.org/presentationml/2006/main">
+  <p:cSld>
+    <p:spTree>
+      <p:nvGrpSpPr>
+        <p:cNvPr id="1" name=""/>
+        <p:cNvGrpSpPr/>
+        <p:nvPr/>
+      </p:nvGrpSpPr>
+      <p:grpSpPr>
+        <a:xfrm>
+          <a:off x="0" y="0"/>
+          <a:ext cx="0" cy="0"/>
+          <a:chOff x="0" y="0"/>
+          <a:chExt cx="0" cy="0"/>
+        </a:xfrm>
+      </p:grpSpPr>
+      <p:sp>
+        <p:nvSpPr>
+          <p:cNvPr id="2" name="Rubrik 1">
+            <a:extLst>
+              <a:ext uri="{FF2B5EF4-FFF2-40B4-BE49-F238E27FC236}">
+                <a16:creationId xmlns:a16="http://schemas.microsoft.com/office/drawing/2014/main" id="{2C444C31-A307-9D41-B672-B1BE8EACB21B}"/>
+              </a:ext>
+            </a:extLst>
+          </p:cNvPr>
+          <p:cNvSpPr>
+            <a:spLocks noGrp="1"/>
+          </p:cNvSpPr>
+          <p:nvPr>
+            <p:ph type="title"/>
+          </p:nvPr>
+        </p:nvSpPr>
+        <p:spPr/>
+        <p:txBody>
+          <a:bodyPr/>
+          <a:lstStyle/>
+          <a:p>
+            <a:r>
+              <a:rPr lang="sv-SE" dirty="0" err="1"/>
+              <a:t>Assignment</a:t>
+            </a:r>
+            <a:r>
+              <a:rPr lang="sv-SE" dirty="0"/>
+              <a:t> 3:</a:t>
+            </a:r>
+          </a:p>
+        </p:txBody>
+      </p:sp>
+      <p:sp>
+        <p:nvSpPr>
+          <p:cNvPr id="3" name="Platshållare för innehåll 2">
+            <a:extLst>
+              <a:ext uri="{FF2B5EF4-FFF2-40B4-BE49-F238E27FC236}">
+                <a16:creationId xmlns:a16="http://schemas.microsoft.com/office/drawing/2014/main" id="{BBE6A963-300B-2545-B8E4-973A3D6B28E5}"/>
+              </a:ext>
+            </a:extLst>
+          </p:cNvPr>
+          <p:cNvSpPr>
+            <a:spLocks noGrp="1"/>
+          </p:cNvSpPr>
+          <p:nvPr>
+            <p:ph idx="1"/>
+          </p:nvPr>
+        </p:nvSpPr>
+        <p:spPr/>
+        <p:txBody>
+          <a:bodyPr/>
+          <a:lstStyle/>
+          <a:p>
+            <a:r>
+              <a:rPr lang="sv-SE" dirty="0"/>
+              <a:t>” </a:t>
+            </a:r>
+            <a:r>
+              <a:rPr lang="sv-SE" dirty="0" err="1"/>
+              <a:t>When</a:t>
+            </a:r>
+            <a:r>
+              <a:rPr lang="sv-SE" dirty="0"/>
+              <a:t> </a:t>
+            </a:r>
+            <a:r>
+              <a:rPr lang="sv-SE" dirty="0" err="1"/>
+              <a:t>can</a:t>
+            </a:r>
+            <a:r>
+              <a:rPr lang="sv-SE" dirty="0"/>
+              <a:t> a feature </a:t>
+            </a:r>
+            <a:r>
+              <a:rPr lang="sv-SE" dirty="0" err="1"/>
+              <a:t>independence</a:t>
+            </a:r>
+            <a:r>
+              <a:rPr lang="sv-SE" dirty="0"/>
+              <a:t> </a:t>
+            </a:r>
+            <a:r>
+              <a:rPr lang="sv-SE" dirty="0" err="1"/>
+              <a:t>assumption</a:t>
+            </a:r>
+            <a:r>
+              <a:rPr lang="sv-SE" dirty="0"/>
+              <a:t> be </a:t>
+            </a:r>
+            <a:r>
+              <a:rPr lang="sv-SE" dirty="0" err="1"/>
+              <a:t>reasonable</a:t>
+            </a:r>
+            <a:r>
+              <a:rPr lang="sv-SE" dirty="0"/>
+              <a:t> and </a:t>
+            </a:r>
+            <a:r>
+              <a:rPr lang="sv-SE" dirty="0" err="1"/>
+              <a:t>when</a:t>
+            </a:r>
+            <a:r>
+              <a:rPr lang="sv-SE" dirty="0"/>
+              <a:t> not?” </a:t>
+            </a:r>
+          </a:p>
+          <a:p>
+            <a:r>
+              <a:rPr lang="sv-SE" dirty="0" err="1"/>
+              <a:t>When</a:t>
+            </a:r>
+            <a:r>
+              <a:rPr lang="sv-SE" dirty="0"/>
+              <a:t> </a:t>
+            </a:r>
+            <a:r>
+              <a:rPr lang="sv-SE" dirty="0" err="1"/>
+              <a:t>they</a:t>
+            </a:r>
+            <a:r>
+              <a:rPr lang="sv-SE" dirty="0"/>
+              <a:t> </a:t>
+            </a:r>
+            <a:r>
+              <a:rPr lang="sv-SE" dirty="0" err="1"/>
+              <a:t>are</a:t>
+            </a:r>
+            <a:r>
+              <a:rPr lang="sv-SE" dirty="0"/>
+              <a:t> not </a:t>
+            </a:r>
+            <a:r>
+              <a:rPr lang="sv-SE" dirty="0" err="1"/>
+              <a:t>obvioulsly</a:t>
+            </a:r>
+            <a:r>
+              <a:rPr lang="sv-SE" dirty="0"/>
+              <a:t> </a:t>
+            </a:r>
+            <a:r>
+              <a:rPr lang="sv-SE" dirty="0" err="1"/>
+              <a:t>correlated</a:t>
+            </a:r>
+            <a:r>
+              <a:rPr lang="sv-SE" dirty="0"/>
+              <a:t>. If </a:t>
+            </a:r>
+            <a:r>
+              <a:rPr lang="sv-SE" dirty="0" err="1"/>
+              <a:t>we</a:t>
+            </a:r>
+            <a:r>
+              <a:rPr lang="sv-SE" dirty="0"/>
+              <a:t> </a:t>
+            </a:r>
+            <a:r>
+              <a:rPr lang="sv-SE" dirty="0" err="1"/>
+              <a:t>see</a:t>
+            </a:r>
+            <a:r>
+              <a:rPr lang="sv-SE" dirty="0"/>
+              <a:t> </a:t>
+            </a:r>
+            <a:r>
+              <a:rPr lang="sv-SE" dirty="0" err="1"/>
+              <a:t>some</a:t>
+            </a:r>
+            <a:r>
+              <a:rPr lang="sv-SE" dirty="0"/>
+              <a:t> </a:t>
+            </a:r>
+            <a:r>
+              <a:rPr lang="sv-SE" dirty="0" err="1"/>
+              <a:t>correlation</a:t>
+            </a:r>
+            <a:r>
+              <a:rPr lang="sv-SE" dirty="0"/>
+              <a:t> </a:t>
+            </a:r>
+            <a:r>
+              <a:rPr lang="sv-SE" dirty="0" err="1"/>
+              <a:t>we</a:t>
+            </a:r>
+            <a:r>
+              <a:rPr lang="sv-SE" dirty="0"/>
+              <a:t> </a:t>
+            </a:r>
+            <a:r>
+              <a:rPr lang="sv-SE" dirty="0" err="1"/>
+              <a:t>should</a:t>
+            </a:r>
+            <a:r>
+              <a:rPr lang="sv-SE" dirty="0"/>
+              <a:t> </a:t>
+            </a:r>
+            <a:r>
+              <a:rPr lang="sv-SE" dirty="0" err="1"/>
+              <a:t>use</a:t>
+            </a:r>
+            <a:r>
+              <a:rPr lang="sv-SE" dirty="0"/>
+              <a:t> </a:t>
+            </a:r>
+            <a:r>
+              <a:rPr lang="sv-SE" dirty="0" err="1"/>
+              <a:t>some</a:t>
+            </a:r>
+            <a:r>
+              <a:rPr lang="sv-SE" dirty="0"/>
+              <a:t> </a:t>
+            </a:r>
+            <a:r>
+              <a:rPr lang="sv-SE" dirty="0" err="1"/>
+              <a:t>other</a:t>
+            </a:r>
+            <a:r>
+              <a:rPr lang="sv-SE" dirty="0"/>
+              <a:t> </a:t>
+            </a:r>
+            <a:r>
+              <a:rPr lang="sv-SE" dirty="0" err="1"/>
+              <a:t>classification</a:t>
+            </a:r>
+            <a:r>
+              <a:rPr lang="sv-SE" dirty="0"/>
+              <a:t> </a:t>
+            </a:r>
+            <a:r>
+              <a:rPr lang="sv-SE" dirty="0" err="1"/>
+              <a:t>method</a:t>
+            </a:r>
+            <a:r>
+              <a:rPr lang="sv-SE" dirty="0"/>
+              <a:t>.</a:t>
+            </a:r>
+          </a:p>
+        </p:txBody>
+      </p:sp>
+    </p:spTree>
+    <p:extLst>
+      <p:ext uri="{BB962C8B-B14F-4D97-AF65-F5344CB8AC3E}">
+        <p14:creationId xmlns:p14="http://schemas.microsoft.com/office/powerpoint/2010/main" val="88651987"/>
+      </p:ext>
+    </p:extLst>
+  </p:cSld>
+  <p:clrMapOvr>
+    <a:masterClrMapping/>
+  </p:clrMapOvr>
+</p:sld>
+</file>
+
+<file path=ppt/slides/slide6.xml><?xml version="1.0" encoding="utf-8"?>
+<p:sld xmlns:a="http://schemas.openxmlformats.org/drawingml/2006/main" xmlns:r="http://schemas.openxmlformats.org/officeDocument/2006/relationships" xmlns:p="http://schemas.openxmlformats.org/presentationml/2006/main">
+  <p:cSld>
+    <p:spTree>
+      <p:nvGrpSpPr>
+        <p:cNvPr id="1" name=""/>
+        <p:cNvGrpSpPr/>
+        <p:nvPr/>
+      </p:nvGrpSpPr>
+      <p:grpSpPr>
+        <a:xfrm>
+          <a:off x="0" y="0"/>
+          <a:ext cx="0" cy="0"/>
+          <a:chOff x="0" y="0"/>
+          <a:chExt cx="0" cy="0"/>
+        </a:xfrm>
+      </p:grpSpPr>
+      <p:sp>
+        <p:nvSpPr>
+          <p:cNvPr id="2" name="Rubrik 1">
+            <a:extLst>
+              <a:ext uri="{FF2B5EF4-FFF2-40B4-BE49-F238E27FC236}">
+                <a16:creationId xmlns:a16="http://schemas.microsoft.com/office/drawing/2014/main" id="{DD0149AF-CED0-7C45-B976-4BE273C497F3}"/>
+              </a:ext>
+            </a:extLst>
+          </p:cNvPr>
+          <p:cNvSpPr>
+            <a:spLocks noGrp="1"/>
+          </p:cNvSpPr>
+          <p:nvPr>
+            <p:ph type="title"/>
+          </p:nvPr>
+        </p:nvSpPr>
+        <p:spPr/>
+        <p:txBody>
+          <a:bodyPr/>
+          <a:lstStyle/>
+          <a:p>
+            <a:r>
+              <a:rPr lang="sv-SE" dirty="0" err="1"/>
+              <a:t>Assignment</a:t>
+            </a:r>
+            <a:r>
+              <a:rPr lang="sv-SE" dirty="0"/>
+              <a:t> 3:</a:t>
+            </a:r>
+          </a:p>
+        </p:txBody>
+      </p:sp>
+      <p:sp>
+        <p:nvSpPr>
+          <p:cNvPr id="3" name="Platshållare för innehåll 2">
+            <a:extLst>
+              <a:ext uri="{FF2B5EF4-FFF2-40B4-BE49-F238E27FC236}">
+                <a16:creationId xmlns:a16="http://schemas.microsoft.com/office/drawing/2014/main" id="{0A9DD1F7-D7DB-354E-8EEB-9411F2FEED66}"/>
+              </a:ext>
+            </a:extLst>
+          </p:cNvPr>
+          <p:cNvSpPr>
+            <a:spLocks noGrp="1"/>
+          </p:cNvSpPr>
+          <p:nvPr>
+            <p:ph idx="1"/>
+          </p:nvPr>
+        </p:nvSpPr>
+        <p:spPr>
+          <a:xfrm>
+            <a:off x="838200" y="1825625"/>
+            <a:ext cx="6777038" cy="4351338"/>
+          </a:xfrm>
+        </p:spPr>
+        <p:txBody>
+          <a:bodyPr/>
+          <a:lstStyle/>
+          <a:p>
+            <a:r>
+              <a:rPr lang="sv-SE" sz="2000" dirty="0"/>
+              <a:t>”</a:t>
+            </a:r>
+            <a:r>
+              <a:rPr lang="sv-SE" sz="2000" dirty="0" err="1"/>
+              <a:t>How</a:t>
+            </a:r>
+            <a:r>
+              <a:rPr lang="sv-SE" sz="2000" dirty="0"/>
+              <a:t> </a:t>
+            </a:r>
+            <a:r>
+              <a:rPr lang="sv-SE" sz="2000" dirty="0" err="1"/>
+              <a:t>does</a:t>
+            </a:r>
+            <a:r>
+              <a:rPr lang="sv-SE" sz="2000" dirty="0"/>
+              <a:t> the decision </a:t>
+            </a:r>
+            <a:r>
+              <a:rPr lang="sv-SE" sz="2000" dirty="0" err="1"/>
+              <a:t>boundary</a:t>
+            </a:r>
+            <a:r>
+              <a:rPr lang="sv-SE" sz="2000" dirty="0"/>
+              <a:t> look for the Iris </a:t>
+            </a:r>
+            <a:r>
+              <a:rPr lang="sv-SE" sz="2000" dirty="0" err="1"/>
+              <a:t>dataset</a:t>
+            </a:r>
+            <a:r>
+              <a:rPr lang="sv-SE" sz="2000" dirty="0"/>
+              <a:t>? </a:t>
+            </a:r>
+            <a:r>
+              <a:rPr lang="sv-SE" sz="2000" dirty="0" err="1"/>
+              <a:t>How</a:t>
+            </a:r>
+            <a:r>
+              <a:rPr lang="sv-SE" sz="2000" dirty="0"/>
+              <a:t> </a:t>
+            </a:r>
+            <a:r>
+              <a:rPr lang="sv-SE" sz="2000" dirty="0" err="1"/>
+              <a:t>could</a:t>
+            </a:r>
+            <a:r>
+              <a:rPr lang="sv-SE" sz="2000" dirty="0"/>
+              <a:t> </a:t>
+            </a:r>
+            <a:r>
+              <a:rPr lang="sv-SE" sz="2000" dirty="0" err="1"/>
+              <a:t>one</a:t>
+            </a:r>
+            <a:r>
+              <a:rPr lang="sv-SE" sz="2000" dirty="0"/>
+              <a:t> </a:t>
+            </a:r>
+            <a:r>
+              <a:rPr lang="sv-SE" sz="2000" dirty="0" err="1"/>
+              <a:t>improve</a:t>
+            </a:r>
+            <a:r>
+              <a:rPr lang="sv-SE" sz="2000" dirty="0"/>
+              <a:t> the </a:t>
+            </a:r>
+            <a:r>
+              <a:rPr lang="sv-SE" sz="2000" dirty="0" err="1"/>
+              <a:t>classification</a:t>
+            </a:r>
+            <a:r>
+              <a:rPr lang="sv-SE" sz="2000" dirty="0"/>
+              <a:t> </a:t>
+            </a:r>
+            <a:r>
+              <a:rPr lang="sv-SE" sz="2000" dirty="0" err="1"/>
+              <a:t>results</a:t>
+            </a:r>
+            <a:r>
+              <a:rPr lang="sv-SE" sz="2000" dirty="0"/>
+              <a:t> for </a:t>
+            </a:r>
+            <a:r>
+              <a:rPr lang="sv-SE" sz="2000" dirty="0" err="1"/>
+              <a:t>this</a:t>
+            </a:r>
+            <a:r>
+              <a:rPr lang="sv-SE" sz="2000" dirty="0"/>
+              <a:t> scenario by </a:t>
+            </a:r>
+            <a:r>
+              <a:rPr lang="sv-SE" sz="2000" dirty="0" err="1"/>
+              <a:t>changing</a:t>
+            </a:r>
+            <a:r>
+              <a:rPr lang="sv-SE" sz="2000" dirty="0"/>
+              <a:t> </a:t>
+            </a:r>
+            <a:r>
+              <a:rPr lang="sv-SE" sz="2000" dirty="0" err="1"/>
+              <a:t>classifier</a:t>
+            </a:r>
+            <a:r>
+              <a:rPr lang="sv-SE" sz="2000" dirty="0"/>
+              <a:t> or, </a:t>
+            </a:r>
+            <a:r>
+              <a:rPr lang="sv-SE" sz="2000" dirty="0" err="1"/>
+              <a:t>alternatively</a:t>
+            </a:r>
+            <a:r>
+              <a:rPr lang="sv-SE" sz="2000" dirty="0"/>
+              <a:t>, manipulating the data? ”</a:t>
+            </a:r>
+          </a:p>
+          <a:p>
+            <a:endParaRPr lang="sv-SE" sz="2000" dirty="0"/>
+          </a:p>
+          <a:p>
+            <a:r>
+              <a:rPr lang="sv-SE" sz="2000" dirty="0" err="1"/>
+              <a:t>We</a:t>
+            </a:r>
+            <a:r>
+              <a:rPr lang="sv-SE" sz="2000" dirty="0"/>
+              <a:t> </a:t>
+            </a:r>
+            <a:r>
+              <a:rPr lang="sv-SE" sz="2000" dirty="0" err="1"/>
+              <a:t>could</a:t>
+            </a:r>
+            <a:r>
+              <a:rPr lang="sv-SE" sz="2000" dirty="0"/>
+              <a:t> </a:t>
+            </a:r>
+            <a:r>
+              <a:rPr lang="sv-SE" sz="2000" dirty="0" err="1"/>
+              <a:t>seperate</a:t>
+            </a:r>
+            <a:r>
+              <a:rPr lang="sv-SE" sz="2000" dirty="0"/>
+              <a:t> the data (</a:t>
+            </a:r>
+            <a:r>
+              <a:rPr lang="sv-SE" sz="2000" dirty="0" err="1"/>
+              <a:t>class</a:t>
+            </a:r>
+            <a:r>
+              <a:rPr lang="sv-SE" sz="2000" dirty="0"/>
+              <a:t> 1 and 2 </a:t>
+            </a:r>
+            <a:r>
+              <a:rPr lang="sv-SE" sz="2000" dirty="0" err="1"/>
+              <a:t>could</a:t>
+            </a:r>
+            <a:r>
+              <a:rPr lang="sv-SE" sz="2000" dirty="0"/>
+              <a:t> </a:t>
+            </a:r>
+            <a:r>
+              <a:rPr lang="sv-SE" sz="2000" dirty="0" err="1"/>
+              <a:t>give</a:t>
+            </a:r>
+            <a:r>
+              <a:rPr lang="sv-SE" sz="2000" dirty="0"/>
+              <a:t> 100% </a:t>
+            </a:r>
+            <a:r>
+              <a:rPr lang="sv-SE" sz="2000" dirty="0" err="1"/>
+              <a:t>accuracy</a:t>
+            </a:r>
+            <a:r>
+              <a:rPr lang="sv-SE" sz="2000" dirty="0"/>
+              <a:t>), </a:t>
+            </a:r>
+            <a:r>
+              <a:rPr lang="sv-SE" sz="2000" dirty="0" err="1"/>
+              <a:t>use</a:t>
+            </a:r>
+            <a:r>
+              <a:rPr lang="sv-SE" sz="2000" dirty="0"/>
+              <a:t> </a:t>
+            </a:r>
+            <a:r>
+              <a:rPr lang="sv-SE" sz="2000" dirty="0" err="1"/>
+              <a:t>some</a:t>
+            </a:r>
+            <a:r>
+              <a:rPr lang="sv-SE" sz="2000" dirty="0"/>
+              <a:t> sort </a:t>
+            </a:r>
+            <a:r>
+              <a:rPr lang="sv-SE" sz="2000" dirty="0" err="1"/>
+              <a:t>of</a:t>
+            </a:r>
+            <a:r>
+              <a:rPr lang="sv-SE" sz="2000" dirty="0"/>
+              <a:t> </a:t>
+            </a:r>
+            <a:r>
+              <a:rPr lang="sv-SE" sz="2000" dirty="0" err="1"/>
+              <a:t>linear</a:t>
+            </a:r>
+            <a:r>
+              <a:rPr lang="sv-SE" sz="2000" dirty="0"/>
+              <a:t> separation </a:t>
+            </a:r>
+            <a:r>
+              <a:rPr lang="sv-SE" sz="2000" dirty="0" err="1"/>
+              <a:t>between</a:t>
+            </a:r>
+            <a:r>
+              <a:rPr lang="sv-SE" sz="2000" dirty="0"/>
+              <a:t> </a:t>
+            </a:r>
+            <a:r>
+              <a:rPr lang="sv-SE" sz="2000" dirty="0" err="1"/>
+              <a:t>class</a:t>
+            </a:r>
+            <a:r>
+              <a:rPr lang="sv-SE" sz="2000" dirty="0"/>
+              <a:t> 1 and 2 (not </a:t>
+            </a:r>
+            <a:r>
+              <a:rPr lang="sv-SE" sz="2000" dirty="0" err="1"/>
+              <a:t>perfect</a:t>
+            </a:r>
+            <a:r>
+              <a:rPr lang="sv-SE" sz="2000" dirty="0"/>
+              <a:t> </a:t>
+            </a:r>
+            <a:r>
+              <a:rPr lang="sv-SE" sz="2000" dirty="0" err="1"/>
+              <a:t>but</a:t>
+            </a:r>
+            <a:r>
+              <a:rPr lang="sv-SE" sz="2000" dirty="0"/>
+              <a:t> </a:t>
+            </a:r>
+            <a:r>
+              <a:rPr lang="sv-SE" sz="2000" dirty="0" err="1"/>
+              <a:t>better</a:t>
+            </a:r>
+            <a:r>
+              <a:rPr lang="sv-SE" sz="2000" dirty="0"/>
+              <a:t>) or by </a:t>
+            </a:r>
+            <a:r>
+              <a:rPr lang="sv-SE" sz="2000" dirty="0" err="1"/>
+              <a:t>using</a:t>
+            </a:r>
+            <a:r>
+              <a:rPr lang="sv-SE" sz="2000" dirty="0"/>
+              <a:t> </a:t>
+            </a:r>
+            <a:r>
+              <a:rPr lang="sv-SE" sz="2000" dirty="0" err="1"/>
+              <a:t>boosting</a:t>
+            </a:r>
+            <a:r>
+              <a:rPr lang="sv-SE" sz="2000" dirty="0"/>
+              <a:t>.</a:t>
+            </a:r>
+          </a:p>
+          <a:p>
+            <a:endParaRPr lang="sv-SE" sz="2000" dirty="0"/>
+          </a:p>
+          <a:p>
+            <a:endParaRPr lang="sv-SE" dirty="0"/>
+          </a:p>
+          <a:p>
+            <a:endParaRPr lang="sv-SE" dirty="0"/>
+          </a:p>
+          <a:p>
+            <a:endParaRPr lang="sv-SE" dirty="0"/>
+          </a:p>
+          <a:p>
+            <a:endParaRPr lang="sv-SE" dirty="0"/>
+          </a:p>
+        </p:txBody>
+      </p:sp>
+      <p:pic>
+        <p:nvPicPr>
+          <p:cNvPr id="4" name="Platshållare för innehåll 3">
+            <a:extLst>
+              <a:ext uri="{FF2B5EF4-FFF2-40B4-BE49-F238E27FC236}">
+                <a16:creationId xmlns:a16="http://schemas.microsoft.com/office/drawing/2014/main" id="{F398CA00-F4FE-FE42-A947-48A6514AD21E}"/>
+              </a:ext>
+            </a:extLst>
+          </p:cNvPr>
+          <p:cNvPicPr>
+            <a:picLocks noChangeAspect="1"/>
+          </p:cNvPicPr>
+          <p:nvPr/>
+        </p:nvPicPr>
+        <p:blipFill>
+          <a:blip r:embed="rId2"/>
+          <a:stretch>
+            <a:fillRect/>
+          </a:stretch>
+        </p:blipFill>
+        <p:spPr>
+          <a:xfrm>
+            <a:off x="7486650" y="1253331"/>
+            <a:ext cx="4515138" cy="3399724"/>
+          </a:xfrm>
+          <a:prstGeom prst="rect">
+            <a:avLst/>
+          </a:prstGeom>
+        </p:spPr>
+      </p:pic>
+    </p:spTree>
+    <p:extLst>
+      <p:ext uri="{BB962C8B-B14F-4D97-AF65-F5344CB8AC3E}">
+        <p14:creationId xmlns:p14="http://schemas.microsoft.com/office/powerpoint/2010/main" val="624435250"/>
+      </p:ext>
+    </p:extLst>
+  </p:cSld>
+  <p:clrMapOvr>
+    <a:masterClrMapping/>
+  </p:clrMapOvr>
+</p:sld>
+</file>
+
+<file path=ppt/slides/slide7.xml><?xml version="1.0" encoding="utf-8"?>
+<p:sld xmlns:a="http://schemas.openxmlformats.org/drawingml/2006/main" xmlns:r="http://schemas.openxmlformats.org/officeDocument/2006/relationships" xmlns:p="http://schemas.openxmlformats.org/presentationml/2006/main">
+  <p:cSld>
+    <p:spTree>
+      <p:nvGrpSpPr>
+        <p:cNvPr id="1" name=""/>
+        <p:cNvGrpSpPr/>
+        <p:nvPr/>
+      </p:nvGrpSpPr>
+      <p:grpSpPr>
+        <a:xfrm>
+          <a:off x="0" y="0"/>
+          <a:ext cx="0" cy="0"/>
+          <a:chOff x="0" y="0"/>
+          <a:chExt cx="0" cy="0"/>
+        </a:xfrm>
+      </p:grpSpPr>
+      <p:sp>
+        <p:nvSpPr>
+          <p:cNvPr id="2" name="Rubrik 1">
+            <a:extLst>
+              <a:ext uri="{FF2B5EF4-FFF2-40B4-BE49-F238E27FC236}">
+                <a16:creationId xmlns:a16="http://schemas.microsoft.com/office/drawing/2014/main" id="{D9C3EB24-62CE-484E-AEF4-D4767FBD6CB6}"/>
+              </a:ext>
+            </a:extLst>
+          </p:cNvPr>
+          <p:cNvSpPr>
+            <a:spLocks noGrp="1"/>
+          </p:cNvSpPr>
+          <p:nvPr>
+            <p:ph type="title"/>
+          </p:nvPr>
+        </p:nvSpPr>
+        <p:spPr/>
+        <p:txBody>
+          <a:bodyPr/>
+          <a:lstStyle/>
+          <a:p>
+            <a:r>
+              <a:rPr lang="sv-SE" dirty="0" err="1"/>
+              <a:t>Assignment</a:t>
+            </a:r>
+            <a:r>
+              <a:rPr lang="sv-SE" dirty="0"/>
+              <a:t> 5: </a:t>
+            </a:r>
+            <a:r>
+              <a:rPr lang="sv-SE" dirty="0" err="1"/>
+              <a:t>Boosted</a:t>
+            </a:r>
+            <a:r>
+              <a:rPr lang="sv-SE" dirty="0"/>
+              <a:t> </a:t>
+            </a:r>
+            <a:r>
+              <a:rPr lang="sv-SE" dirty="0" err="1"/>
+              <a:t>Bayes</a:t>
+            </a:r>
+            <a:r>
+              <a:rPr lang="sv-SE" dirty="0"/>
+              <a:t> on Iris</a:t>
+            </a:r>
+          </a:p>
+        </p:txBody>
+      </p:sp>
+      <p:pic>
+        <p:nvPicPr>
+          <p:cNvPr id="7" name="Platshållare för innehåll 6">
+            <a:extLst>
+              <a:ext uri="{FF2B5EF4-FFF2-40B4-BE49-F238E27FC236}">
+                <a16:creationId xmlns:a16="http://schemas.microsoft.com/office/drawing/2014/main" id="{0D840295-5099-004A-A6DB-E903794A82E8}"/>
+              </a:ext>
+            </a:extLst>
+          </p:cNvPr>
+          <p:cNvPicPr>
+            <a:picLocks noGrp="1" noChangeAspect="1"/>
+          </p:cNvPicPr>
+          <p:nvPr>
+            <p:ph idx="1"/>
+          </p:nvPr>
+        </p:nvPicPr>
+        <p:blipFill>
+          <a:blip r:embed="rId2"/>
+          <a:stretch>
+            <a:fillRect/>
+          </a:stretch>
+        </p:blipFill>
+        <p:spPr>
+          <a:xfrm>
+            <a:off x="838200" y="1830441"/>
+            <a:ext cx="8947578" cy="2624137"/>
+          </a:xfrm>
+          <a:prstGeom prst="rect">
+            <a:avLst/>
+          </a:prstGeom>
+        </p:spPr>
+      </p:pic>
+    </p:spTree>
+    <p:extLst>
+      <p:ext uri="{BB962C8B-B14F-4D97-AF65-F5344CB8AC3E}">
+        <p14:creationId xmlns:p14="http://schemas.microsoft.com/office/powerpoint/2010/main" val="2122330380"/>
+      </p:ext>
+    </p:extLst>
+  </p:cSld>
+  <p:clrMapOvr>
+    <a:masterClrMapping/>
+  </p:clrMapOvr>
+</p:sld>
+</file>
+
+<file path=ppt/slides/slide8.xml><?xml version="1.0" encoding="utf-8"?>
+<p:sld xmlns:a="http://schemas.openxmlformats.org/drawingml/2006/main" xmlns:r="http://schemas.openxmlformats.org/officeDocument/2006/relationships" xmlns:p="http://schemas.openxmlformats.org/presentationml/2006/main">
+  <p:cSld>
+    <p:spTree>
+      <p:nvGrpSpPr>
+        <p:cNvPr id="1" name=""/>
+        <p:cNvGrpSpPr/>
+        <p:nvPr/>
+      </p:nvGrpSpPr>
+      <p:grpSpPr>
+        <a:xfrm>
+          <a:off x="0" y="0"/>
+          <a:ext cx="0" cy="0"/>
+          <a:chOff x="0" y="0"/>
+          <a:chExt cx="0" cy="0"/>
+        </a:xfrm>
+      </p:grpSpPr>
+      <p:sp>
+        <p:nvSpPr>
+          <p:cNvPr id="2" name="Rubrik 1">
+            <a:extLst>
+              <a:ext uri="{FF2B5EF4-FFF2-40B4-BE49-F238E27FC236}">
+                <a16:creationId xmlns:a16="http://schemas.microsoft.com/office/drawing/2014/main" id="{5C166539-7A6C-4941-B984-B84C8708613E}"/>
+              </a:ext>
+            </a:extLst>
+          </p:cNvPr>
+          <p:cNvSpPr>
+            <a:spLocks noGrp="1"/>
+          </p:cNvSpPr>
+          <p:nvPr>
+            <p:ph type="title"/>
+          </p:nvPr>
+        </p:nvSpPr>
+        <p:spPr/>
+        <p:txBody>
+          <a:bodyPr/>
+          <a:lstStyle/>
+          <a:p>
+            <a:r>
+              <a:rPr lang="sv-SE" dirty="0" err="1"/>
+              <a:t>Assignment</a:t>
+            </a:r>
+            <a:r>
+              <a:rPr lang="sv-SE" dirty="0"/>
+              <a:t> 5: </a:t>
+            </a:r>
+            <a:r>
+              <a:rPr lang="sv-SE" dirty="0" err="1"/>
+              <a:t>Boosted</a:t>
+            </a:r>
+            <a:r>
+              <a:rPr lang="sv-SE" dirty="0"/>
+              <a:t> </a:t>
+            </a:r>
+            <a:r>
+              <a:rPr lang="sv-SE" dirty="0" err="1"/>
+              <a:t>Bayes</a:t>
+            </a:r>
+            <a:r>
+              <a:rPr lang="sv-SE" dirty="0"/>
+              <a:t> on </a:t>
+            </a:r>
+            <a:r>
+              <a:rPr lang="sv-SE" dirty="0" err="1"/>
+              <a:t>Vowels</a:t>
+            </a:r>
+            <a:endParaRPr lang="sv-SE" dirty="0"/>
+          </a:p>
+        </p:txBody>
+      </p:sp>
+      <p:pic>
+        <p:nvPicPr>
+          <p:cNvPr id="4" name="Platshållare för innehåll 3">
+            <a:extLst>
+              <a:ext uri="{FF2B5EF4-FFF2-40B4-BE49-F238E27FC236}">
+                <a16:creationId xmlns:a16="http://schemas.microsoft.com/office/drawing/2014/main" id="{C97A1A76-224D-DE4C-B976-2C48838209E2}"/>
+              </a:ext>
+            </a:extLst>
+          </p:cNvPr>
+          <p:cNvPicPr>
+            <a:picLocks noGrp="1" noChangeAspect="1"/>
+          </p:cNvPicPr>
+          <p:nvPr>
+            <p:ph idx="1"/>
+          </p:nvPr>
+        </p:nvPicPr>
+        <p:blipFill>
+          <a:blip r:embed="rId2"/>
+          <a:stretch>
+            <a:fillRect/>
+          </a:stretch>
+        </p:blipFill>
+        <p:spPr>
+          <a:xfrm>
+            <a:off x="1018659" y="1905397"/>
+            <a:ext cx="9508054" cy="3047206"/>
+          </a:xfrm>
+          <a:prstGeom prst="rect">
+            <a:avLst/>
+          </a:prstGeom>
+        </p:spPr>
+      </p:pic>
+      <p:sp>
+        <p:nvSpPr>
+          <p:cNvPr id="5" name="textruta 4">
+            <a:extLst>
+              <a:ext uri="{FF2B5EF4-FFF2-40B4-BE49-F238E27FC236}">
+                <a16:creationId xmlns:a16="http://schemas.microsoft.com/office/drawing/2014/main" id="{17873848-84E0-EA47-9311-0407BB6D7F81}"/>
+              </a:ext>
+            </a:extLst>
+          </p:cNvPr>
+          <p:cNvSpPr txBox="1"/>
+          <p:nvPr/>
+        </p:nvSpPr>
+        <p:spPr>
+          <a:xfrm>
+            <a:off x="2457450" y="5429250"/>
+            <a:ext cx="1334020" cy="369332"/>
+          </a:xfrm>
+          <a:prstGeom prst="rect">
+            <a:avLst/>
+          </a:prstGeom>
+          <a:noFill/>
+        </p:spPr>
+        <p:txBody>
+          <a:bodyPr wrap="none" rtlCol="0">
+            <a:spAutoFit/>
+          </a:bodyPr>
+          <a:lstStyle/>
+          <a:p>
+            <a:r>
+              <a:rPr lang="sv-SE" dirty="0">
+                <a:sym typeface="Wingdings" pitchFamily="2" charset="2"/>
+              </a:rPr>
+              <a:t>64.7  80.2</a:t>
+            </a:r>
+            <a:endParaRPr lang="sv-SE" dirty="0"/>
+          </a:p>
+        </p:txBody>
+      </p:sp>
+    </p:spTree>
+    <p:extLst>
+      <p:ext uri="{BB962C8B-B14F-4D97-AF65-F5344CB8AC3E}">
+        <p14:creationId xmlns:p14="http://schemas.microsoft.com/office/powerpoint/2010/main" val="942000265"/>
+      </p:ext>
+    </p:extLst>
+  </p:cSld>
+  <p:clrMapOvr>
+    <a:masterClrMapping/>
+  </p:clrMapOvr>
+</p:sld>
+</file>
+
+<file path=ppt/slides/slide9.xml><?xml version="1.0" encoding="utf-8"?>
+<p:sld xmlns:a="http://schemas.openxmlformats.org/drawingml/2006/main" xmlns:r="http://schemas.openxmlformats.org/officeDocument/2006/relationships" xmlns:p="http://schemas.openxmlformats.org/presentationml/2006/main">
+  <p:cSld>
+    <p:spTree>
+      <p:nvGrpSpPr>
+        <p:cNvPr id="1" name=""/>
+        <p:cNvGrpSpPr/>
+        <p:nvPr/>
+      </p:nvGrpSpPr>
+      <p:grpSpPr>
+        <a:xfrm>
+          <a:off x="0" y="0"/>
+          <a:ext cx="0" cy="0"/>
+          <a:chOff x="0" y="0"/>
+          <a:chExt cx="0" cy="0"/>
+        </a:xfrm>
+      </p:grpSpPr>
+      <p:sp>
+        <p:nvSpPr>
+          <p:cNvPr id="2" name="Rubrik 1">
+            <a:extLst>
+              <a:ext uri="{FF2B5EF4-FFF2-40B4-BE49-F238E27FC236}">
+                <a16:creationId xmlns:a16="http://schemas.microsoft.com/office/drawing/2014/main" id="{02A2E9A1-2A1D-9C41-9DA0-B74EA81E3919}"/>
+              </a:ext>
+            </a:extLst>
+          </p:cNvPr>
+          <p:cNvSpPr>
+            <a:spLocks noGrp="1"/>
+          </p:cNvSpPr>
+          <p:nvPr>
+            <p:ph type="title"/>
+          </p:nvPr>
+        </p:nvSpPr>
+        <p:spPr/>
+        <p:txBody>
+          <a:bodyPr/>
+          <a:lstStyle/>
+          <a:p>
+            <a:r>
+              <a:rPr lang="sv-SE" dirty="0" err="1"/>
+              <a:t>Assignment</a:t>
+            </a:r>
+            <a:r>
+              <a:rPr lang="sv-SE" dirty="0"/>
+              <a:t> 5: </a:t>
+            </a:r>
+            <a:r>
+              <a:rPr lang="sv-SE" dirty="0" err="1"/>
+              <a:t>Boosted</a:t>
+            </a:r>
+            <a:r>
+              <a:rPr lang="sv-SE" dirty="0"/>
+              <a:t> Iris </a:t>
+            </a:r>
+            <a:r>
+              <a:rPr lang="sv-SE" dirty="0" err="1"/>
+              <a:t>Boundries</a:t>
+            </a:r>
+            <a:endParaRPr lang="sv-SE" dirty="0"/>
+          </a:p>
+        </p:txBody>
+      </p:sp>
+      <p:pic>
+        <p:nvPicPr>
+          <p:cNvPr id="4" name="Platshållare för innehåll 3">
+            <a:extLst>
+              <a:ext uri="{FF2B5EF4-FFF2-40B4-BE49-F238E27FC236}">
+                <a16:creationId xmlns:a16="http://schemas.microsoft.com/office/drawing/2014/main" id="{919D65CD-7DE2-4641-9F26-4ACE6711A98C}"/>
+              </a:ext>
+            </a:extLst>
+          </p:cNvPr>
+          <p:cNvPicPr>
+            <a:picLocks noGrp="1" noChangeAspect="1"/>
+          </p:cNvPicPr>
+          <p:nvPr>
+            <p:ph idx="1"/>
+          </p:nvPr>
+        </p:nvPicPr>
+        <p:blipFill>
+          <a:blip r:embed="rId2"/>
+          <a:stretch>
+            <a:fillRect/>
+          </a:stretch>
+        </p:blipFill>
+        <p:spPr>
+          <a:xfrm>
+            <a:off x="8243888" y="3913775"/>
+            <a:ext cx="3757900" cy="2852150"/>
+          </a:xfrm>
+          <a:prstGeom prst="rect">
+            <a:avLst/>
+          </a:prstGeom>
+        </p:spPr>
+      </p:pic>
+      <p:pic>
+        <p:nvPicPr>
+          <p:cNvPr id="5" name="Platshållare för innehåll 3">
+            <a:extLst>
+              <a:ext uri="{FF2B5EF4-FFF2-40B4-BE49-F238E27FC236}">
+                <a16:creationId xmlns:a16="http://schemas.microsoft.com/office/drawing/2014/main" id="{062E71AD-BAF7-764B-9C6A-1F7135BC2D95}"/>
+              </a:ext>
+            </a:extLst>
+          </p:cNvPr>
+          <p:cNvPicPr>
+            <a:picLocks noChangeAspect="1"/>
+          </p:cNvPicPr>
+          <p:nvPr/>
+        </p:nvPicPr>
+        <p:blipFill>
+          <a:blip r:embed="rId3"/>
+          <a:stretch>
+            <a:fillRect/>
+          </a:stretch>
+        </p:blipFill>
+        <p:spPr>
+          <a:xfrm>
+            <a:off x="8243888" y="1253331"/>
+            <a:ext cx="3757900" cy="2829553"/>
+          </a:xfrm>
+          <a:prstGeom prst="rect">
+            <a:avLst/>
+          </a:prstGeom>
+        </p:spPr>
+      </p:pic>
+      <p:sp>
+        <p:nvSpPr>
+          <p:cNvPr id="9" name="textruta 8">
+            <a:extLst>
+              <a:ext uri="{FF2B5EF4-FFF2-40B4-BE49-F238E27FC236}">
+                <a16:creationId xmlns:a16="http://schemas.microsoft.com/office/drawing/2014/main" id="{5E4C2F2A-0B66-304A-B284-33D0F40451E6}"/>
+              </a:ext>
+            </a:extLst>
+          </p:cNvPr>
+          <p:cNvSpPr txBox="1"/>
+          <p:nvPr/>
+        </p:nvSpPr>
+        <p:spPr>
+          <a:xfrm>
+            <a:off x="1303283" y="1860331"/>
+            <a:ext cx="6542047" cy="923330"/>
+          </a:xfrm>
+          <a:prstGeom prst="rect">
+            <a:avLst/>
+          </a:prstGeom>
+          <a:noFill/>
+        </p:spPr>
+        <p:txBody>
+          <a:bodyPr wrap="none" rtlCol="0">
+            <a:spAutoFit/>
+          </a:bodyPr>
+          <a:lstStyle/>
+          <a:p>
+            <a:r>
+              <a:rPr lang="sv-SE" dirty="0"/>
+              <a:t>Is </a:t>
+            </a:r>
+            <a:r>
+              <a:rPr lang="sv-SE" dirty="0" err="1"/>
+              <a:t>there</a:t>
+            </a:r>
+            <a:r>
+              <a:rPr lang="sv-SE" dirty="0"/>
+              <a:t> </a:t>
+            </a:r>
+            <a:r>
+              <a:rPr lang="sv-SE" dirty="0" err="1"/>
+              <a:t>any</a:t>
+            </a:r>
+            <a:r>
+              <a:rPr lang="sv-SE" dirty="0"/>
+              <a:t> </a:t>
+            </a:r>
+            <a:r>
+              <a:rPr lang="sv-SE" dirty="0" err="1"/>
+              <a:t>improvement</a:t>
+            </a:r>
+            <a:r>
+              <a:rPr lang="sv-SE" dirty="0"/>
+              <a:t> in </a:t>
+            </a:r>
+            <a:r>
+              <a:rPr lang="sv-SE" dirty="0" err="1"/>
+              <a:t>classification</a:t>
+            </a:r>
+            <a:r>
+              <a:rPr lang="sv-SE" dirty="0"/>
+              <a:t> </a:t>
+            </a:r>
+            <a:r>
+              <a:rPr lang="sv-SE" dirty="0" err="1"/>
+              <a:t>accuracy</a:t>
+            </a:r>
+            <a:r>
+              <a:rPr lang="sv-SE" dirty="0"/>
+              <a:t>? </a:t>
+            </a:r>
+            <a:r>
+              <a:rPr lang="sv-SE" dirty="0" err="1"/>
+              <a:t>Why</a:t>
+            </a:r>
+            <a:r>
+              <a:rPr lang="sv-SE" dirty="0"/>
+              <a:t>/</a:t>
+            </a:r>
+            <a:r>
+              <a:rPr lang="sv-SE" dirty="0" err="1"/>
+              <a:t>why</a:t>
+            </a:r>
+            <a:r>
+              <a:rPr lang="sv-SE" dirty="0"/>
+              <a:t> not? </a:t>
+            </a:r>
+          </a:p>
+          <a:p>
+            <a:endParaRPr lang="sv-SE" dirty="0"/>
+          </a:p>
+          <a:p>
+            <a:r>
+              <a:rPr lang="sv-SE" dirty="0" err="1"/>
+              <a:t>Yes</a:t>
+            </a:r>
+            <a:r>
+              <a:rPr lang="sv-SE" dirty="0"/>
+              <a:t>! 89 </a:t>
+            </a:r>
+            <a:r>
+              <a:rPr lang="sv-SE" dirty="0">
+                <a:sym typeface="Wingdings" pitchFamily="2" charset="2"/>
+              </a:rPr>
+              <a:t> 94.1</a:t>
+            </a:r>
+            <a:endParaRPr lang="sv-SE" dirty="0"/>
+          </a:p>
+        </p:txBody>
+      </p:sp>
+      <p:sp>
+        <p:nvSpPr>
+          <p:cNvPr id="10" name="textruta 9">
+            <a:extLst>
+              <a:ext uri="{FF2B5EF4-FFF2-40B4-BE49-F238E27FC236}">
+                <a16:creationId xmlns:a16="http://schemas.microsoft.com/office/drawing/2014/main" id="{9AE2055F-422B-4142-A104-259378701EB7}"/>
+              </a:ext>
+            </a:extLst>
+          </p:cNvPr>
+          <p:cNvSpPr txBox="1"/>
+          <p:nvPr/>
+        </p:nvSpPr>
+        <p:spPr>
+          <a:xfrm>
+            <a:off x="1303283" y="3058677"/>
+            <a:ext cx="7041931" cy="1477328"/>
+          </a:xfrm>
+          <a:prstGeom prst="rect">
+            <a:avLst/>
+          </a:prstGeom>
+          <a:noFill/>
+        </p:spPr>
+        <p:txBody>
+          <a:bodyPr wrap="square" rtlCol="0">
+            <a:spAutoFit/>
+          </a:bodyPr>
+          <a:lstStyle/>
+          <a:p>
+            <a:r>
+              <a:rPr lang="sv-SE" dirty="0" err="1"/>
+              <a:t>Plot</a:t>
+            </a:r>
+            <a:r>
+              <a:rPr lang="sv-SE" dirty="0"/>
+              <a:t> the decision </a:t>
+            </a:r>
+            <a:r>
+              <a:rPr lang="sv-SE" dirty="0" err="1"/>
+              <a:t>boundary</a:t>
+            </a:r>
+            <a:r>
+              <a:rPr lang="sv-SE" dirty="0"/>
+              <a:t> </a:t>
+            </a:r>
+            <a:r>
+              <a:rPr lang="sv-SE" dirty="0" err="1"/>
+              <a:t>of</a:t>
+            </a:r>
+            <a:r>
+              <a:rPr lang="sv-SE" dirty="0"/>
+              <a:t> the </a:t>
+            </a:r>
+            <a:r>
+              <a:rPr lang="sv-SE" dirty="0" err="1"/>
+              <a:t>boosted</a:t>
+            </a:r>
+            <a:r>
+              <a:rPr lang="sv-SE" dirty="0"/>
+              <a:t> </a:t>
+            </a:r>
+            <a:r>
+              <a:rPr lang="sv-SE" dirty="0" err="1"/>
+              <a:t>classifier</a:t>
+            </a:r>
+            <a:r>
+              <a:rPr lang="sv-SE" dirty="0"/>
+              <a:t> on iris and </a:t>
+            </a:r>
+            <a:r>
+              <a:rPr lang="sv-SE" dirty="0" err="1"/>
+              <a:t>compare</a:t>
+            </a:r>
+            <a:r>
+              <a:rPr lang="sv-SE" dirty="0"/>
+              <a:t> it </a:t>
+            </a:r>
+            <a:r>
+              <a:rPr lang="sv-SE" dirty="0" err="1"/>
+              <a:t>with</a:t>
+            </a:r>
+            <a:r>
+              <a:rPr lang="sv-SE" dirty="0"/>
+              <a:t> </a:t>
+            </a:r>
+            <a:r>
+              <a:rPr lang="sv-SE" dirty="0" err="1"/>
+              <a:t>that</a:t>
+            </a:r>
+            <a:r>
+              <a:rPr lang="sv-SE" dirty="0"/>
+              <a:t> </a:t>
+            </a:r>
+            <a:r>
+              <a:rPr lang="sv-SE" dirty="0" err="1"/>
+              <a:t>of</a:t>
+            </a:r>
+            <a:r>
+              <a:rPr lang="sv-SE" dirty="0"/>
+              <a:t> the </a:t>
+            </a:r>
+            <a:r>
+              <a:rPr lang="sv-SE" dirty="0" err="1"/>
+              <a:t>basic</a:t>
+            </a:r>
+            <a:r>
+              <a:rPr lang="sv-SE" dirty="0"/>
+              <a:t>. </a:t>
+            </a:r>
+            <a:r>
+              <a:rPr lang="sv-SE" dirty="0" err="1"/>
+              <a:t>What</a:t>
+            </a:r>
+            <a:r>
+              <a:rPr lang="sv-SE" dirty="0"/>
+              <a:t> </a:t>
+            </a:r>
+            <a:r>
+              <a:rPr lang="sv-SE" dirty="0" err="1"/>
+              <a:t>differences</a:t>
+            </a:r>
+            <a:r>
+              <a:rPr lang="sv-SE" dirty="0"/>
+              <a:t> do </a:t>
+            </a:r>
+            <a:r>
+              <a:rPr lang="sv-SE" dirty="0" err="1"/>
+              <a:t>you</a:t>
+            </a:r>
+            <a:r>
+              <a:rPr lang="sv-SE" dirty="0"/>
+              <a:t> </a:t>
+            </a:r>
+            <a:r>
+              <a:rPr lang="sv-SE" dirty="0" err="1"/>
+              <a:t>notice</a:t>
+            </a:r>
+            <a:r>
+              <a:rPr lang="sv-SE" dirty="0"/>
+              <a:t>? Is the </a:t>
+            </a:r>
+            <a:r>
+              <a:rPr lang="sv-SE" dirty="0" err="1"/>
+              <a:t>boundary</a:t>
+            </a:r>
+            <a:r>
+              <a:rPr lang="sv-SE" dirty="0"/>
+              <a:t> </a:t>
+            </a:r>
+            <a:r>
+              <a:rPr lang="sv-SE" dirty="0" err="1"/>
+              <a:t>of</a:t>
+            </a:r>
+            <a:r>
+              <a:rPr lang="sv-SE" dirty="0"/>
+              <a:t> the </a:t>
+            </a:r>
+            <a:r>
+              <a:rPr lang="sv-SE" dirty="0" err="1"/>
+              <a:t>boosted</a:t>
+            </a:r>
+            <a:r>
+              <a:rPr lang="sv-SE" dirty="0"/>
+              <a:t> version </a:t>
+            </a:r>
+            <a:r>
+              <a:rPr lang="sv-SE" dirty="0" err="1"/>
+              <a:t>more</a:t>
+            </a:r>
+            <a:r>
+              <a:rPr lang="sv-SE" dirty="0"/>
+              <a:t> </a:t>
+            </a:r>
+            <a:r>
+              <a:rPr lang="sv-SE" dirty="0" err="1"/>
+              <a:t>complex</a:t>
+            </a:r>
+            <a:r>
+              <a:rPr lang="sv-SE" dirty="0"/>
+              <a:t>? </a:t>
+            </a:r>
+          </a:p>
+          <a:p>
+            <a:endParaRPr lang="sv-SE" dirty="0"/>
+          </a:p>
+          <a:p>
+            <a:r>
+              <a:rPr lang="sv-SE" dirty="0" err="1"/>
+              <a:t>More</a:t>
+            </a:r>
+            <a:r>
+              <a:rPr lang="sv-SE" dirty="0"/>
+              <a:t> </a:t>
+            </a:r>
+            <a:r>
+              <a:rPr lang="sv-SE" dirty="0" err="1"/>
+              <a:t>complex</a:t>
+            </a:r>
+            <a:r>
+              <a:rPr lang="sv-SE" dirty="0"/>
+              <a:t> and </a:t>
+            </a:r>
+            <a:r>
+              <a:rPr lang="sv-SE" dirty="0" err="1"/>
+              <a:t>better</a:t>
+            </a:r>
+            <a:r>
+              <a:rPr lang="sv-SE" dirty="0"/>
+              <a:t> </a:t>
+            </a:r>
+            <a:r>
+              <a:rPr lang="sv-SE" dirty="0" err="1"/>
+              <a:t>suited</a:t>
+            </a:r>
+            <a:r>
+              <a:rPr lang="sv-SE" dirty="0"/>
+              <a:t> for data</a:t>
+            </a:r>
+          </a:p>
+        </p:txBody>
+      </p:sp>
+      <p:sp>
+        <p:nvSpPr>
+          <p:cNvPr id="11" name="textruta 10">
+            <a:extLst>
+              <a:ext uri="{FF2B5EF4-FFF2-40B4-BE49-F238E27FC236}">
+                <a16:creationId xmlns:a16="http://schemas.microsoft.com/office/drawing/2014/main" id="{C6B9DE42-16E2-0A49-8B3E-BEE7E047B90C}"/>
+              </a:ext>
+            </a:extLst>
+          </p:cNvPr>
+          <p:cNvSpPr txBox="1"/>
+          <p:nvPr/>
+        </p:nvSpPr>
+        <p:spPr>
+          <a:xfrm>
+            <a:off x="1303283" y="4736179"/>
+            <a:ext cx="6940605" cy="1754326"/>
+          </a:xfrm>
+          <a:prstGeom prst="rect">
+            <a:avLst/>
+          </a:prstGeom>
+          <a:noFill/>
+        </p:spPr>
+        <p:txBody>
+          <a:bodyPr wrap="square" rtlCol="0">
+            <a:spAutoFit/>
+          </a:bodyPr>
+          <a:lstStyle/>
+          <a:p>
+            <a:r>
+              <a:rPr lang="sv-SE" dirty="0" err="1"/>
+              <a:t>Can</a:t>
+            </a:r>
+            <a:r>
+              <a:rPr lang="sv-SE" dirty="0"/>
+              <a:t> </a:t>
+            </a:r>
+            <a:r>
+              <a:rPr lang="sv-SE" dirty="0" err="1"/>
+              <a:t>we</a:t>
+            </a:r>
+            <a:r>
+              <a:rPr lang="sv-SE" dirty="0"/>
+              <a:t> make </a:t>
+            </a:r>
+            <a:r>
+              <a:rPr lang="sv-SE" dirty="0" err="1"/>
+              <a:t>up</a:t>
+            </a:r>
+            <a:r>
+              <a:rPr lang="sv-SE" dirty="0"/>
+              <a:t> for not </a:t>
+            </a:r>
+            <a:r>
+              <a:rPr lang="sv-SE" dirty="0" err="1"/>
+              <a:t>using</a:t>
+            </a:r>
+            <a:r>
+              <a:rPr lang="sv-SE" dirty="0"/>
+              <a:t> a </a:t>
+            </a:r>
+            <a:r>
+              <a:rPr lang="sv-SE" dirty="0" err="1"/>
+              <a:t>more</a:t>
+            </a:r>
+            <a:r>
+              <a:rPr lang="sv-SE" dirty="0"/>
+              <a:t> </a:t>
+            </a:r>
+            <a:r>
+              <a:rPr lang="sv-SE" dirty="0" err="1"/>
+              <a:t>advanced</a:t>
+            </a:r>
+            <a:r>
+              <a:rPr lang="sv-SE" dirty="0"/>
+              <a:t> </a:t>
+            </a:r>
+            <a:r>
+              <a:rPr lang="sv-SE" dirty="0" err="1"/>
+              <a:t>model</a:t>
+            </a:r>
+            <a:r>
+              <a:rPr lang="sv-SE" dirty="0"/>
+              <a:t> in the </a:t>
+            </a:r>
+            <a:r>
+              <a:rPr lang="sv-SE" dirty="0" err="1"/>
+              <a:t>basic</a:t>
+            </a:r>
+            <a:r>
+              <a:rPr lang="sv-SE" dirty="0"/>
+              <a:t> </a:t>
+            </a:r>
+            <a:r>
+              <a:rPr lang="sv-SE" dirty="0" err="1"/>
+              <a:t>classifier</a:t>
+            </a:r>
+            <a:r>
+              <a:rPr lang="sv-SE" dirty="0"/>
+              <a:t> by </a:t>
+            </a:r>
+            <a:r>
+              <a:rPr lang="sv-SE" dirty="0" err="1"/>
+              <a:t>using</a:t>
+            </a:r>
+            <a:r>
+              <a:rPr lang="sv-SE" dirty="0"/>
+              <a:t> </a:t>
+            </a:r>
+            <a:r>
+              <a:rPr lang="sv-SE" dirty="0" err="1"/>
+              <a:t>boosting</a:t>
+            </a:r>
+            <a:r>
+              <a:rPr lang="sv-SE" dirty="0"/>
+              <a:t>? </a:t>
+            </a:r>
+          </a:p>
+          <a:p>
+            <a:endParaRPr lang="sv-SE" dirty="0"/>
+          </a:p>
+          <a:p>
+            <a:r>
+              <a:rPr lang="sv-SE" dirty="0" err="1"/>
+              <a:t>Yes</a:t>
+            </a:r>
+            <a:r>
+              <a:rPr lang="sv-SE" dirty="0"/>
+              <a:t>! </a:t>
+            </a:r>
+            <a:r>
+              <a:rPr lang="sv-SE" dirty="0" err="1"/>
+              <a:t>We</a:t>
+            </a:r>
+            <a:r>
+              <a:rPr lang="sv-SE" dirty="0"/>
+              <a:t> </a:t>
+            </a:r>
+            <a:r>
+              <a:rPr lang="sv-SE" dirty="0" err="1"/>
+              <a:t>can</a:t>
+            </a:r>
+            <a:r>
+              <a:rPr lang="sv-SE" dirty="0"/>
+              <a:t> </a:t>
+            </a:r>
+            <a:r>
+              <a:rPr lang="sv-SE" dirty="0" err="1"/>
+              <a:t>use</a:t>
+            </a:r>
+            <a:r>
+              <a:rPr lang="sv-SE" dirty="0"/>
+              <a:t> </a:t>
+            </a:r>
+            <a:r>
+              <a:rPr lang="sv-SE" dirty="0" err="1"/>
+              <a:t>Adaboosting</a:t>
+            </a:r>
+            <a:r>
+              <a:rPr lang="sv-SE" dirty="0"/>
+              <a:t> for </a:t>
+            </a:r>
+            <a:r>
+              <a:rPr lang="sv-SE" dirty="0" err="1"/>
+              <a:t>weak</a:t>
+            </a:r>
+            <a:r>
+              <a:rPr lang="sv-SE" dirty="0"/>
+              <a:t> </a:t>
+            </a:r>
+            <a:r>
+              <a:rPr lang="sv-SE" dirty="0" err="1"/>
+              <a:t>classifiers</a:t>
+            </a:r>
+            <a:r>
+              <a:rPr lang="sv-SE" dirty="0"/>
+              <a:t> </a:t>
+            </a:r>
+            <a:r>
+              <a:rPr lang="sv-SE" dirty="0" err="1"/>
+              <a:t>with</a:t>
+            </a:r>
+            <a:r>
+              <a:rPr lang="sv-SE" dirty="0"/>
+              <a:t> </a:t>
+            </a:r>
+            <a:r>
+              <a:rPr lang="sv-SE" dirty="0" err="1"/>
+              <a:t>error</a:t>
+            </a:r>
+            <a:r>
+              <a:rPr lang="sv-SE" dirty="0"/>
+              <a:t> less </a:t>
+            </a:r>
+            <a:r>
+              <a:rPr lang="sv-SE" dirty="0" err="1"/>
+              <a:t>than</a:t>
+            </a:r>
+            <a:r>
+              <a:rPr lang="sv-SE" dirty="0"/>
+              <a:t> 50%</a:t>
+            </a:r>
+          </a:p>
+          <a:p>
+            <a:endParaRPr lang="sv-SE" dirty="0"/>
+          </a:p>
+        </p:txBody>
+      </p:sp>
+    </p:spTree>
+    <p:extLst>
+      <p:ext uri="{BB962C8B-B14F-4D97-AF65-F5344CB8AC3E}">
+        <p14:creationId xmlns:p14="http://schemas.microsoft.com/office/powerpoint/2010/main" val="4151523066"/>
+      </p:ext>
+    </p:extLst>
+  </p:cSld>
+  <p:clrMapOvr>
+    <a:masterClrMapping/>
+  </p:clrMapOvr>
+</p:sld>
+</file>
+
 <file path=ppt/theme/theme1.xml><?xml version="1.0" encoding="utf-8"?>
 <a:theme xmlns:a="http://schemas.openxmlformats.org/drawingml/2006/main" name="Office-tema">
   <a:themeElements>

</xml_diff>